<commit_message>
updated some stuff or whatever
</commit_message>
<xml_diff>
--- a/img/IntroSplashScreens.pptx
+++ b/img/IntroSplashScreens.pptx
@@ -5,7 +5,7 @@
     <p:sldMasterId id="2147483648" r:id="rId1"/>
   </p:sldMasterIdLst>
   <p:notesMasterIdLst>
-    <p:notesMasterId r:id="rId56"/>
+    <p:notesMasterId r:id="rId59"/>
   </p:notesMasterIdLst>
   <p:sldIdLst>
     <p:sldId id="288" r:id="rId2"/>
@@ -55,13 +55,16 @@
     <p:sldId id="334" r:id="rId46"/>
     <p:sldId id="335" r:id="rId47"/>
     <p:sldId id="336" r:id="rId48"/>
-    <p:sldId id="337" r:id="rId49"/>
-    <p:sldId id="338" r:id="rId50"/>
-    <p:sldId id="339" r:id="rId51"/>
-    <p:sldId id="340" r:id="rId52"/>
-    <p:sldId id="341" r:id="rId53"/>
-    <p:sldId id="342" r:id="rId54"/>
-    <p:sldId id="343" r:id="rId55"/>
+    <p:sldId id="344" r:id="rId49"/>
+    <p:sldId id="337" r:id="rId50"/>
+    <p:sldId id="338" r:id="rId51"/>
+    <p:sldId id="339" r:id="rId52"/>
+    <p:sldId id="340" r:id="rId53"/>
+    <p:sldId id="341" r:id="rId54"/>
+    <p:sldId id="342" r:id="rId55"/>
+    <p:sldId id="343" r:id="rId56"/>
+    <p:sldId id="345" r:id="rId57"/>
+    <p:sldId id="346" r:id="rId58"/>
   </p:sldIdLst>
   <p:sldSz cx="12192000" cy="6858000"/>
   <p:notesSz cx="6858000" cy="9144000"/>
@@ -1255,7 +1258,7 @@
           <a:p>
             <a:fld id="{0B4A1E68-2091-D94D-8657-726C8FD779DD}" type="slidenum">
               <a:rPr lang="en-US" smtClean="0"/>
-              <a:t>49</a:t>
+              <a:t>50</a:t>
             </a:fld>
             <a:endParaRPr lang="en-US"/>
           </a:p>
@@ -6767,7 +6770,7 @@
         </p:nvSpPr>
         <p:spPr>
           <a:xfrm>
-            <a:off x="1119196" y="2687637"/>
+            <a:off x="759600" y="2687637"/>
             <a:ext cx="7245997" cy="3152986"/>
           </a:xfrm>
         </p:spPr>
@@ -6954,7 +6957,7 @@
         </p:nvSpPr>
         <p:spPr>
           <a:xfrm>
-            <a:off x="8633636" y="2687637"/>
+            <a:off x="8272800" y="2687637"/>
             <a:ext cx="2785729" cy="3152986"/>
           </a:xfrm>
           <a:prstGeom prst="rect">
@@ -12313,7 +12316,7 @@
         </p:nvSpPr>
         <p:spPr>
           <a:xfrm>
-            <a:off x="1119196" y="2322101"/>
+            <a:off x="759600" y="2322101"/>
             <a:ext cx="7245997" cy="3518522"/>
           </a:xfrm>
         </p:spPr>
@@ -12593,7 +12596,7 @@
         </p:nvSpPr>
         <p:spPr>
           <a:xfrm>
-            <a:off x="8365194" y="2322101"/>
+            <a:off x="8006400" y="2322101"/>
             <a:ext cx="3054172" cy="3518522"/>
           </a:xfrm>
           <a:prstGeom prst="rect">
@@ -19271,7 +19274,7 @@
         </p:nvSpPr>
         <p:spPr>
           <a:xfrm>
-            <a:off x="1119196" y="2322101"/>
+            <a:off x="759600" y="2322101"/>
             <a:ext cx="7245997" cy="3518522"/>
           </a:xfrm>
         </p:spPr>
@@ -19603,8 +19606,8 @@
         </p:nvSpPr>
         <p:spPr>
           <a:xfrm>
-            <a:off x="8365194" y="2322101"/>
-            <a:ext cx="3054172" cy="3518522"/>
+            <a:off x="8006400" y="2322101"/>
+            <a:ext cx="2794950" cy="3650074"/>
           </a:xfrm>
           <a:prstGeom prst="rect">
             <a:avLst/>
@@ -19887,7 +19890,7 @@
                   <a:srgbClr val="FFFFF0"/>
                 </a:solidFill>
               </a:rPr>
-              <a:t>Zaniti</a:t>
+              <a:t>Zanitti</a:t>
             </a:r>
             <a:endParaRPr lang="en-US" sz="2100" dirty="0">
               <a:solidFill>
@@ -25157,7 +25160,7 @@
         </p:nvSpPr>
         <p:spPr>
           <a:xfrm>
-            <a:off x="1119196" y="2687637"/>
+            <a:off x="759600" y="2687637"/>
             <a:ext cx="7245997" cy="3152986"/>
           </a:xfrm>
         </p:spPr>
@@ -25344,7 +25347,7 @@
         </p:nvSpPr>
         <p:spPr>
           <a:xfrm>
-            <a:off x="8633636" y="2687637"/>
+            <a:off x="8272800" y="2687637"/>
             <a:ext cx="2785729" cy="3152986"/>
           </a:xfrm>
           <a:prstGeom prst="rect">
@@ -31709,7 +31712,7 @@
         </p:nvSpPr>
         <p:spPr>
           <a:xfrm>
-            <a:off x="1119196" y="2322101"/>
+            <a:off x="759600" y="2322101"/>
             <a:ext cx="7245997" cy="3518522"/>
           </a:xfrm>
         </p:spPr>
@@ -31828,7 +31831,15 @@
                   <a:srgbClr val="FFFFF0"/>
                 </a:solidFill>
               </a:rPr>
-              <a:t>No-effort fully reproducible analysis cod</a:t>
+              <a:t>No-effort fully reproducible analysis code with </a:t>
+            </a:r>
+            <a:r>
+              <a:rPr lang="en-US" sz="2300" dirty="0" err="1">
+                <a:solidFill>
+                  <a:srgbClr val="FFFFF0"/>
+                </a:solidFill>
+              </a:rPr>
+              <a:t>FieldTrip</a:t>
             </a:r>
             <a:r>
               <a:rPr lang="en-US" dirty="0">
@@ -31986,7 +31997,7 @@
         </p:nvSpPr>
         <p:spPr>
           <a:xfrm>
-            <a:off x="8365194" y="2322101"/>
+            <a:off x="8006400" y="2322101"/>
             <a:ext cx="3054172" cy="3518522"/>
           </a:xfrm>
           <a:prstGeom prst="rect">
@@ -38534,7 +38545,7 @@
         </p:nvSpPr>
         <p:spPr>
           <a:xfrm>
-            <a:off x="1119196" y="2322101"/>
+            <a:off x="759600" y="2322101"/>
             <a:ext cx="7245997" cy="3518522"/>
           </a:xfrm>
         </p:spPr>
@@ -38822,7 +38833,7 @@
         </p:nvSpPr>
         <p:spPr>
           <a:xfrm>
-            <a:off x="8365194" y="2322101"/>
+            <a:off x="8006400" y="2322101"/>
             <a:ext cx="3054172" cy="3518522"/>
           </a:xfrm>
           <a:prstGeom prst="rect">
@@ -39088,7 +39099,7 @@
                 <a:tab pos="7466013" algn="r"/>
               </a:tabLst>
             </a:pPr>
-            <a:endParaRPr lang="en-US" sz="2100" dirty="0">
+            <a:endParaRPr lang="en-US" sz="1700" dirty="0">
               <a:solidFill>
                 <a:srgbClr val="FFFFF0"/>
               </a:solidFill>
@@ -44483,8 +44494,8 @@
         </p:nvSpPr>
         <p:spPr>
           <a:xfrm>
-            <a:off x="8633636" y="2687637"/>
-            <a:ext cx="2785729" cy="3152986"/>
+            <a:off x="8272800" y="2687637"/>
+            <a:ext cx="2464643" cy="3152986"/>
           </a:xfrm>
           <a:prstGeom prst="rect">
             <a:avLst/>
@@ -44721,7 +44732,7 @@
         </p:nvSpPr>
         <p:spPr>
           <a:xfrm>
-            <a:off x="1119196" y="2687637"/>
+            <a:off x="759600" y="2687637"/>
             <a:ext cx="7245997" cy="3152986"/>
           </a:xfrm>
         </p:spPr>
@@ -45433,6 +45444,1203 @@
 </file>
 
 <file path=ppt/slides/slide48.xml><?xml version="1.0" encoding="utf-8"?>
+<p:sld xmlns:a="http://schemas.openxmlformats.org/drawingml/2006/main" xmlns:r="http://schemas.openxmlformats.org/officeDocument/2006/relationships" xmlns:p="http://schemas.openxmlformats.org/presentationml/2006/main">
+  <p:cSld>
+    <p:spTree>
+      <p:nvGrpSpPr>
+        <p:cNvPr id="1" name=""/>
+        <p:cNvGrpSpPr/>
+        <p:nvPr/>
+      </p:nvGrpSpPr>
+      <p:grpSpPr>
+        <a:xfrm>
+          <a:off x="0" y="0"/>
+          <a:ext cx="0" cy="0"/>
+          <a:chOff x="0" y="0"/>
+          <a:chExt cx="0" cy="0"/>
+        </a:xfrm>
+      </p:grpSpPr>
+      <p:sp>
+        <p:nvSpPr>
+          <p:cNvPr id="22" name="Rectangle 21">
+            <a:extLst>
+              <a:ext uri="{FF2B5EF4-FFF2-40B4-BE49-F238E27FC236}">
+                <a16:creationId xmlns:a16="http://schemas.microsoft.com/office/drawing/2014/main" id="{CA4673A4-8F86-064D-AC32-13773CCF4EEE}"/>
+              </a:ext>
+            </a:extLst>
+          </p:cNvPr>
+          <p:cNvSpPr/>
+          <p:nvPr/>
+        </p:nvSpPr>
+        <p:spPr>
+          <a:xfrm>
+            <a:off x="-10633" y="-10633"/>
+            <a:ext cx="12213266" cy="6879267"/>
+          </a:xfrm>
+          <a:prstGeom prst="rect">
+            <a:avLst/>
+          </a:prstGeom>
+          <a:solidFill>
+            <a:srgbClr val="004E63"/>
+          </a:solidFill>
+          <a:ln>
+            <a:noFill/>
+          </a:ln>
+        </p:spPr>
+        <p:style>
+          <a:lnRef idx="2">
+            <a:schemeClr val="accent1">
+              <a:shade val="50000"/>
+            </a:schemeClr>
+          </a:lnRef>
+          <a:fillRef idx="1">
+            <a:schemeClr val="accent1"/>
+          </a:fillRef>
+          <a:effectRef idx="0">
+            <a:schemeClr val="accent1"/>
+          </a:effectRef>
+          <a:fontRef idx="minor">
+            <a:schemeClr val="lt1"/>
+          </a:fontRef>
+        </p:style>
+        <p:txBody>
+          <a:bodyPr rot="0" spcFirstLastPara="0" vertOverflow="overflow" horzOverflow="overflow" vert="horz" wrap="square" lIns="91440" tIns="45720" rIns="91440" bIns="45720" numCol="1" spcCol="0" rtlCol="0" fromWordArt="0" anchor="ctr" anchorCtr="0" forceAA="0" compatLnSpc="1">
+            <a:prstTxWarp prst="textNoShape">
+              <a:avLst/>
+            </a:prstTxWarp>
+            <a:noAutofit/>
+          </a:bodyPr>
+          <a:lstStyle/>
+          <a:p>
+            <a:pPr algn="ctr"/>
+            <a:endParaRPr lang="en-US" dirty="0"/>
+          </a:p>
+        </p:txBody>
+      </p:sp>
+      <p:sp>
+        <p:nvSpPr>
+          <p:cNvPr id="8" name="Title 4">
+            <a:extLst>
+              <a:ext uri="{FF2B5EF4-FFF2-40B4-BE49-F238E27FC236}">
+                <a16:creationId xmlns:a16="http://schemas.microsoft.com/office/drawing/2014/main" id="{8F23FD7A-4B95-5E4C-B56B-A318F33EE1CF}"/>
+              </a:ext>
+            </a:extLst>
+          </p:cNvPr>
+          <p:cNvSpPr>
+            <a:spLocks noGrp="1"/>
+          </p:cNvSpPr>
+          <p:nvPr>
+            <p:ph type="title"/>
+          </p:nvPr>
+        </p:nvSpPr>
+        <p:spPr>
+          <a:xfrm>
+            <a:off x="838199" y="681037"/>
+            <a:ext cx="10515600" cy="1325563"/>
+          </a:xfrm>
+        </p:spPr>
+        <p:txBody>
+          <a:bodyPr anchor="b">
+            <a:noAutofit/>
+          </a:bodyPr>
+          <a:lstStyle/>
+          <a:p>
+            <a:pPr>
+              <a:spcBef>
+                <a:spcPts val="2400"/>
+              </a:spcBef>
+              <a:spcAft>
+                <a:spcPts val="2400"/>
+              </a:spcAft>
+            </a:pPr>
+            <a:r>
+              <a:rPr lang="en-GB" b="1" dirty="0">
+                <a:solidFill>
+                  <a:srgbClr val="FFFFF0"/>
+                </a:solidFill>
+                <a:latin typeface="Avenir Book" panose="02000503020000020003" pitchFamily="2" charset="0"/>
+              </a:rPr>
+              <a:t>Past, Present &amp; Future: Keynote</a:t>
+            </a:r>
+            <a:endParaRPr lang="en-US" b="1" dirty="0">
+              <a:solidFill>
+                <a:srgbClr val="FFFFF0"/>
+              </a:solidFill>
+              <a:latin typeface="Avenir Book" panose="02000503020000020003" pitchFamily="2" charset="0"/>
+            </a:endParaRPr>
+          </a:p>
+        </p:txBody>
+      </p:sp>
+      <p:cxnSp>
+        <p:nvCxnSpPr>
+          <p:cNvPr id="9" name="Straight Connector 8">
+            <a:extLst>
+              <a:ext uri="{FF2B5EF4-FFF2-40B4-BE49-F238E27FC236}">
+                <a16:creationId xmlns:a16="http://schemas.microsoft.com/office/drawing/2014/main" id="{D2F14239-B243-E348-8BD3-C9B1D4EA8220}"/>
+              </a:ext>
+            </a:extLst>
+          </p:cNvPr>
+          <p:cNvCxnSpPr>
+            <a:cxnSpLocks/>
+          </p:cNvCxnSpPr>
+          <p:nvPr/>
+        </p:nvCxnSpPr>
+        <p:spPr>
+          <a:xfrm>
+            <a:off x="612483" y="1094481"/>
+            <a:ext cx="0" cy="1001812"/>
+          </a:xfrm>
+          <a:prstGeom prst="line">
+            <a:avLst/>
+          </a:prstGeom>
+          <a:noFill/>
+          <a:ln w="76200" cap="flat">
+            <a:solidFill>
+              <a:srgbClr val="FFFFF0"/>
+            </a:solidFill>
+            <a:prstDash val="solid"/>
+            <a:miter lim="400000"/>
+          </a:ln>
+          <a:effectLst/>
+          <a:sp3d/>
+        </p:spPr>
+        <p:style>
+          <a:lnRef idx="0">
+            <a:scrgbClr r="0" g="0" b="0"/>
+          </a:lnRef>
+          <a:fillRef idx="0">
+            <a:scrgbClr r="0" g="0" b="0"/>
+          </a:fillRef>
+          <a:effectRef idx="0">
+            <a:scrgbClr r="0" g="0" b="0"/>
+          </a:effectRef>
+          <a:fontRef idx="none"/>
+        </p:style>
+      </p:cxnSp>
+      <p:pic>
+        <p:nvPicPr>
+          <p:cNvPr id="20" name="Picture 19">
+            <a:extLst>
+              <a:ext uri="{FF2B5EF4-FFF2-40B4-BE49-F238E27FC236}">
+                <a16:creationId xmlns:a16="http://schemas.microsoft.com/office/drawing/2014/main" id="{63BB0563-379A-DE4F-8DD0-A22D366408FB}"/>
+              </a:ext>
+            </a:extLst>
+          </p:cNvPr>
+          <p:cNvPicPr>
+            <a:picLocks noChangeAspect="1"/>
+          </p:cNvPicPr>
+          <p:nvPr/>
+        </p:nvPicPr>
+        <p:blipFill rotWithShape="1">
+          <a:blip r:embed="rId2"/>
+          <a:srcRect b="8869"/>
+          <a:stretch/>
+        </p:blipFill>
+        <p:spPr>
+          <a:xfrm>
+            <a:off x="9010852" y="177025"/>
+            <a:ext cx="2964892" cy="1227863"/>
+          </a:xfrm>
+          <a:prstGeom prst="rect">
+            <a:avLst/>
+          </a:prstGeom>
+        </p:spPr>
+      </p:pic>
+      <p:sp>
+        <p:nvSpPr>
+          <p:cNvPr id="21" name="Content Placeholder 6">
+            <a:extLst>
+              <a:ext uri="{FF2B5EF4-FFF2-40B4-BE49-F238E27FC236}">
+                <a16:creationId xmlns:a16="http://schemas.microsoft.com/office/drawing/2014/main" id="{94F95A8E-0578-9E4C-8654-B175F1C9769C}"/>
+              </a:ext>
+            </a:extLst>
+          </p:cNvPr>
+          <p:cNvSpPr txBox="1">
+            <a:spLocks/>
+          </p:cNvSpPr>
+          <p:nvPr/>
+        </p:nvSpPr>
+        <p:spPr>
+          <a:xfrm>
+            <a:off x="8272800" y="2687637"/>
+            <a:ext cx="2464643" cy="3152986"/>
+          </a:xfrm>
+          <a:prstGeom prst="rect">
+            <a:avLst/>
+          </a:prstGeom>
+        </p:spPr>
+        <p:txBody>
+          <a:bodyPr vert="horz" lIns="91440" tIns="45720" rIns="91440" bIns="45720" rtlCol="0">
+            <a:normAutofit/>
+          </a:bodyPr>
+          <a:lstStyle>
+            <a:lvl1pPr marL="228600" indent="-228600" algn="l" defTabSz="914400" rtl="0" eaLnBrk="1" latinLnBrk="0" hangingPunct="1">
+              <a:lnSpc>
+                <a:spcPct val="90000"/>
+              </a:lnSpc>
+              <a:spcBef>
+                <a:spcPts val="1000"/>
+              </a:spcBef>
+              <a:buFont typeface="Arial" panose="020B0604020202020204" pitchFamily="34" charset="0"/>
+              <a:buChar char="•"/>
+              <a:defRPr sz="2800" kern="1200">
+                <a:solidFill>
+                  <a:schemeClr val="tx1"/>
+                </a:solidFill>
+                <a:latin typeface="+mn-lt"/>
+                <a:ea typeface="+mn-ea"/>
+                <a:cs typeface="+mn-cs"/>
+              </a:defRPr>
+            </a:lvl1pPr>
+            <a:lvl2pPr marL="685800" indent="-228600" algn="l" defTabSz="914400" rtl="0" eaLnBrk="1" latinLnBrk="0" hangingPunct="1">
+              <a:lnSpc>
+                <a:spcPct val="90000"/>
+              </a:lnSpc>
+              <a:spcBef>
+                <a:spcPts val="500"/>
+              </a:spcBef>
+              <a:buFont typeface="Arial" panose="020B0604020202020204" pitchFamily="34" charset="0"/>
+              <a:buChar char="•"/>
+              <a:defRPr sz="2400" kern="1200">
+                <a:solidFill>
+                  <a:schemeClr val="tx1"/>
+                </a:solidFill>
+                <a:latin typeface="+mn-lt"/>
+                <a:ea typeface="+mn-ea"/>
+                <a:cs typeface="+mn-cs"/>
+              </a:defRPr>
+            </a:lvl2pPr>
+            <a:lvl3pPr marL="1143000" indent="-228600" algn="l" defTabSz="914400" rtl="0" eaLnBrk="1" latinLnBrk="0" hangingPunct="1">
+              <a:lnSpc>
+                <a:spcPct val="90000"/>
+              </a:lnSpc>
+              <a:spcBef>
+                <a:spcPts val="500"/>
+              </a:spcBef>
+              <a:buFont typeface="Arial" panose="020B0604020202020204" pitchFamily="34" charset="0"/>
+              <a:buChar char="•"/>
+              <a:defRPr sz="2000" kern="1200">
+                <a:solidFill>
+                  <a:schemeClr val="tx1"/>
+                </a:solidFill>
+                <a:latin typeface="+mn-lt"/>
+                <a:ea typeface="+mn-ea"/>
+                <a:cs typeface="+mn-cs"/>
+              </a:defRPr>
+            </a:lvl3pPr>
+            <a:lvl4pPr marL="1600200" indent="-228600" algn="l" defTabSz="914400" rtl="0" eaLnBrk="1" latinLnBrk="0" hangingPunct="1">
+              <a:lnSpc>
+                <a:spcPct val="90000"/>
+              </a:lnSpc>
+              <a:spcBef>
+                <a:spcPts val="500"/>
+              </a:spcBef>
+              <a:buFont typeface="Arial" panose="020B0604020202020204" pitchFamily="34" charset="0"/>
+              <a:buChar char="•"/>
+              <a:defRPr sz="1800" kern="1200">
+                <a:solidFill>
+                  <a:schemeClr val="tx1"/>
+                </a:solidFill>
+                <a:latin typeface="+mn-lt"/>
+                <a:ea typeface="+mn-ea"/>
+                <a:cs typeface="+mn-cs"/>
+              </a:defRPr>
+            </a:lvl4pPr>
+            <a:lvl5pPr marL="2057400" indent="-228600" algn="l" defTabSz="914400" rtl="0" eaLnBrk="1" latinLnBrk="0" hangingPunct="1">
+              <a:lnSpc>
+                <a:spcPct val="90000"/>
+              </a:lnSpc>
+              <a:spcBef>
+                <a:spcPts val="500"/>
+              </a:spcBef>
+              <a:buFont typeface="Arial" panose="020B0604020202020204" pitchFamily="34" charset="0"/>
+              <a:buChar char="•"/>
+              <a:defRPr sz="1800" kern="1200">
+                <a:solidFill>
+                  <a:schemeClr val="tx1"/>
+                </a:solidFill>
+                <a:latin typeface="+mn-lt"/>
+                <a:ea typeface="+mn-ea"/>
+                <a:cs typeface="+mn-cs"/>
+              </a:defRPr>
+            </a:lvl5pPr>
+            <a:lvl6pPr marL="2514600" indent="-228600" algn="l" defTabSz="914400" rtl="0" eaLnBrk="1" latinLnBrk="0" hangingPunct="1">
+              <a:lnSpc>
+                <a:spcPct val="90000"/>
+              </a:lnSpc>
+              <a:spcBef>
+                <a:spcPts val="500"/>
+              </a:spcBef>
+              <a:buFont typeface="Arial" panose="020B0604020202020204" pitchFamily="34" charset="0"/>
+              <a:buChar char="•"/>
+              <a:defRPr sz="1800" kern="1200">
+                <a:solidFill>
+                  <a:schemeClr val="tx1"/>
+                </a:solidFill>
+                <a:latin typeface="+mn-lt"/>
+                <a:ea typeface="+mn-ea"/>
+                <a:cs typeface="+mn-cs"/>
+              </a:defRPr>
+            </a:lvl6pPr>
+            <a:lvl7pPr marL="2971800" indent="-228600" algn="l" defTabSz="914400" rtl="0" eaLnBrk="1" latinLnBrk="0" hangingPunct="1">
+              <a:lnSpc>
+                <a:spcPct val="90000"/>
+              </a:lnSpc>
+              <a:spcBef>
+                <a:spcPts val="500"/>
+              </a:spcBef>
+              <a:buFont typeface="Arial" panose="020B0604020202020204" pitchFamily="34" charset="0"/>
+              <a:buChar char="•"/>
+              <a:defRPr sz="1800" kern="1200">
+                <a:solidFill>
+                  <a:schemeClr val="tx1"/>
+                </a:solidFill>
+                <a:latin typeface="+mn-lt"/>
+                <a:ea typeface="+mn-ea"/>
+                <a:cs typeface="+mn-cs"/>
+              </a:defRPr>
+            </a:lvl7pPr>
+            <a:lvl8pPr marL="3429000" indent="-228600" algn="l" defTabSz="914400" rtl="0" eaLnBrk="1" latinLnBrk="0" hangingPunct="1">
+              <a:lnSpc>
+                <a:spcPct val="90000"/>
+              </a:lnSpc>
+              <a:spcBef>
+                <a:spcPts val="500"/>
+              </a:spcBef>
+              <a:buFont typeface="Arial" panose="020B0604020202020204" pitchFamily="34" charset="0"/>
+              <a:buChar char="•"/>
+              <a:defRPr sz="1800" kern="1200">
+                <a:solidFill>
+                  <a:schemeClr val="tx1"/>
+                </a:solidFill>
+                <a:latin typeface="+mn-lt"/>
+                <a:ea typeface="+mn-ea"/>
+                <a:cs typeface="+mn-cs"/>
+              </a:defRPr>
+            </a:lvl8pPr>
+            <a:lvl9pPr marL="3886200" indent="-228600" algn="l" defTabSz="914400" rtl="0" eaLnBrk="1" latinLnBrk="0" hangingPunct="1">
+              <a:lnSpc>
+                <a:spcPct val="90000"/>
+              </a:lnSpc>
+              <a:spcBef>
+                <a:spcPts val="500"/>
+              </a:spcBef>
+              <a:buFont typeface="Arial" panose="020B0604020202020204" pitchFamily="34" charset="0"/>
+              <a:buChar char="•"/>
+              <a:defRPr sz="1800" kern="1200">
+                <a:solidFill>
+                  <a:schemeClr val="tx1"/>
+                </a:solidFill>
+                <a:latin typeface="+mn-lt"/>
+                <a:ea typeface="+mn-ea"/>
+                <a:cs typeface="+mn-cs"/>
+              </a:defRPr>
+            </a:lvl9pPr>
+          </a:lstStyle>
+          <a:p>
+            <a:pPr marL="0" indent="0">
+              <a:lnSpc>
+                <a:spcPct val="110000"/>
+              </a:lnSpc>
+              <a:spcBef>
+                <a:spcPts val="400"/>
+              </a:spcBef>
+              <a:buNone/>
+              <a:tabLst>
+                <a:tab pos="7466013" algn="r"/>
+              </a:tabLst>
+            </a:pPr>
+            <a:r>
+              <a:rPr lang="en-US" sz="2400" dirty="0" err="1">
+                <a:solidFill>
+                  <a:srgbClr val="FFFFF0"/>
+                </a:solidFill>
+              </a:rPr>
+              <a:t>Johnes</a:t>
+            </a:r>
+            <a:r>
+              <a:rPr lang="en-US" sz="2400" dirty="0">
+                <a:solidFill>
+                  <a:srgbClr val="FFFFF0"/>
+                </a:solidFill>
+              </a:rPr>
+              <a:t> </a:t>
+            </a:r>
+            <a:r>
+              <a:rPr lang="en-US" sz="2400" dirty="0" err="1">
+                <a:solidFill>
+                  <a:srgbClr val="FFFFF0"/>
+                </a:solidFill>
+              </a:rPr>
+              <a:t>Obungoloch</a:t>
+            </a:r>
+            <a:endParaRPr lang="en-US" sz="2400" dirty="0">
+              <a:solidFill>
+                <a:srgbClr val="FFFFF0"/>
+              </a:solidFill>
+            </a:endParaRPr>
+          </a:p>
+        </p:txBody>
+      </p:sp>
+      <p:sp>
+        <p:nvSpPr>
+          <p:cNvPr id="26" name="Content Placeholder 6">
+            <a:extLst>
+              <a:ext uri="{FF2B5EF4-FFF2-40B4-BE49-F238E27FC236}">
+                <a16:creationId xmlns:a16="http://schemas.microsoft.com/office/drawing/2014/main" id="{656E9633-8B8C-3441-BE0B-014A4047B8C0}"/>
+              </a:ext>
+            </a:extLst>
+          </p:cNvPr>
+          <p:cNvSpPr>
+            <a:spLocks noGrp="1"/>
+          </p:cNvSpPr>
+          <p:nvPr>
+            <p:ph idx="1"/>
+          </p:nvPr>
+        </p:nvSpPr>
+        <p:spPr>
+          <a:xfrm>
+            <a:off x="759600" y="2687637"/>
+            <a:ext cx="7245997" cy="3152986"/>
+          </a:xfrm>
+        </p:spPr>
+        <p:txBody>
+          <a:bodyPr>
+            <a:normAutofit/>
+          </a:bodyPr>
+          <a:lstStyle/>
+          <a:p>
+            <a:pPr marL="514350" indent="-514350">
+              <a:lnSpc>
+                <a:spcPct val="110000"/>
+              </a:lnSpc>
+              <a:spcBef>
+                <a:spcPts val="400"/>
+              </a:spcBef>
+              <a:buFont typeface="+mj-lt"/>
+              <a:buAutoNum type="arabicPeriod"/>
+              <a:tabLst>
+                <a:tab pos="7466013" algn="r"/>
+              </a:tabLst>
+            </a:pPr>
+            <a:r>
+              <a:rPr lang="en-US" sz="2400" dirty="0">
+                <a:solidFill>
+                  <a:srgbClr val="FFFFF0"/>
+                </a:solidFill>
+              </a:rPr>
+              <a:t>Low Field MRI - a possible brain imaging modality for sub-Saharan Africa</a:t>
+            </a:r>
+            <a:r>
+              <a:rPr lang="en-US" sz="3800" dirty="0">
+                <a:solidFill>
+                  <a:srgbClr val="FFFFF0"/>
+                </a:solidFill>
+              </a:rPr>
+              <a:t>	</a:t>
+            </a:r>
+          </a:p>
+        </p:txBody>
+      </p:sp>
+      <p:grpSp>
+        <p:nvGrpSpPr>
+          <p:cNvPr id="27" name="Group 26">
+            <a:extLst>
+              <a:ext uri="{FF2B5EF4-FFF2-40B4-BE49-F238E27FC236}">
+                <a16:creationId xmlns:a16="http://schemas.microsoft.com/office/drawing/2014/main" id="{AF4D93E1-A76C-7248-B207-5D035C574947}"/>
+              </a:ext>
+            </a:extLst>
+          </p:cNvPr>
+          <p:cNvGrpSpPr/>
+          <p:nvPr/>
+        </p:nvGrpSpPr>
+        <p:grpSpPr>
+          <a:xfrm>
+            <a:off x="2997713" y="6266614"/>
+            <a:ext cx="1916953" cy="429351"/>
+            <a:chOff x="2838223" y="4704775"/>
+            <a:chExt cx="1916953" cy="429351"/>
+          </a:xfrm>
+        </p:grpSpPr>
+        <p:pic>
+          <p:nvPicPr>
+            <p:cNvPr id="28" name="Picture 27">
+              <a:extLst>
+                <a:ext uri="{FF2B5EF4-FFF2-40B4-BE49-F238E27FC236}">
+                  <a16:creationId xmlns:a16="http://schemas.microsoft.com/office/drawing/2014/main" id="{502EE3E3-5A13-9043-AEE5-F74ED87D8D3A}"/>
+                </a:ext>
+              </a:extLst>
+            </p:cNvPr>
+            <p:cNvPicPr>
+              <a:picLocks noChangeAspect="1"/>
+            </p:cNvPicPr>
+            <p:nvPr/>
+          </p:nvPicPr>
+          <p:blipFill>
+            <a:blip r:embed="rId3"/>
+            <a:stretch>
+              <a:fillRect/>
+            </a:stretch>
+          </p:blipFill>
+          <p:spPr>
+            <a:xfrm>
+              <a:off x="2838223" y="4719765"/>
+              <a:ext cx="385796" cy="399371"/>
+            </a:xfrm>
+            <a:prstGeom prst="rect">
+              <a:avLst/>
+            </a:prstGeom>
+          </p:spPr>
+        </p:pic>
+        <p:sp>
+          <p:nvSpPr>
+            <p:cNvPr id="30" name="Title 4">
+              <a:extLst>
+                <a:ext uri="{FF2B5EF4-FFF2-40B4-BE49-F238E27FC236}">
+                  <a16:creationId xmlns:a16="http://schemas.microsoft.com/office/drawing/2014/main" id="{15A9758D-FA0D-2F45-82F7-3B920A1F0EA9}"/>
+                </a:ext>
+              </a:extLst>
+            </p:cNvPr>
+            <p:cNvSpPr txBox="1">
+              <a:spLocks/>
+            </p:cNvSpPr>
+            <p:nvPr/>
+          </p:nvSpPr>
+          <p:spPr>
+            <a:xfrm>
+              <a:off x="3236024" y="4704775"/>
+              <a:ext cx="1519152" cy="429351"/>
+            </a:xfrm>
+            <a:prstGeom prst="rect">
+              <a:avLst/>
+            </a:prstGeom>
+          </p:spPr>
+          <p:txBody>
+            <a:bodyPr vert="horz" lIns="91440" tIns="45720" rIns="91440" bIns="45720" rtlCol="0" anchor="ctr">
+              <a:noAutofit/>
+            </a:bodyPr>
+            <a:lstStyle>
+              <a:lvl1pPr algn="l" defTabSz="914400" rtl="0" eaLnBrk="1" latinLnBrk="0" hangingPunct="1">
+                <a:lnSpc>
+                  <a:spcPct val="90000"/>
+                </a:lnSpc>
+                <a:spcBef>
+                  <a:spcPct val="0"/>
+                </a:spcBef>
+                <a:buNone/>
+                <a:defRPr sz="4400" kern="1200">
+                  <a:solidFill>
+                    <a:schemeClr val="tx1"/>
+                  </a:solidFill>
+                  <a:latin typeface="+mj-lt"/>
+                  <a:ea typeface="+mj-ea"/>
+                  <a:cs typeface="+mj-cs"/>
+                </a:defRPr>
+              </a:lvl1pPr>
+            </a:lstStyle>
+            <a:p>
+              <a:pPr>
+                <a:spcBef>
+                  <a:spcPts val="2400"/>
+                </a:spcBef>
+                <a:spcAft>
+                  <a:spcPts val="2400"/>
+                </a:spcAft>
+              </a:pPr>
+              <a:r>
+                <a:rPr lang="en-GB" sz="1600" dirty="0">
+                  <a:solidFill>
+                    <a:srgbClr val="FFFFF0"/>
+                  </a:solidFill>
+                  <a:latin typeface="Avenir Book" panose="02000503020000020003" pitchFamily="2" charset="0"/>
+                </a:rPr>
+                <a:t>@</a:t>
+              </a:r>
+              <a:r>
+                <a:rPr lang="en-GB" sz="1600" dirty="0" err="1">
+                  <a:solidFill>
+                    <a:srgbClr val="FFFFF0"/>
+                  </a:solidFill>
+                  <a:latin typeface="Avenir Book" panose="02000503020000020003" pitchFamily="2" charset="0"/>
+                </a:rPr>
+                <a:t>OHBMOpen</a:t>
+              </a:r>
+              <a:endParaRPr lang="en-US" sz="1600" dirty="0">
+                <a:solidFill>
+                  <a:srgbClr val="FFFFF0"/>
+                </a:solidFill>
+                <a:latin typeface="Avenir Book" panose="02000503020000020003" pitchFamily="2" charset="0"/>
+              </a:endParaRPr>
+            </a:p>
+          </p:txBody>
+        </p:sp>
+      </p:grpSp>
+      <p:grpSp>
+        <p:nvGrpSpPr>
+          <p:cNvPr id="31" name="Group 30">
+            <a:extLst>
+              <a:ext uri="{FF2B5EF4-FFF2-40B4-BE49-F238E27FC236}">
+                <a16:creationId xmlns:a16="http://schemas.microsoft.com/office/drawing/2014/main" id="{0E15B4E1-AE39-1542-B137-FBBC720F85BD}"/>
+              </a:ext>
+            </a:extLst>
+          </p:cNvPr>
+          <p:cNvGrpSpPr/>
+          <p:nvPr/>
+        </p:nvGrpSpPr>
+        <p:grpSpPr>
+          <a:xfrm>
+            <a:off x="4974493" y="6260264"/>
+            <a:ext cx="2426983" cy="442051"/>
+            <a:chOff x="4931963" y="4698425"/>
+            <a:chExt cx="2426983" cy="442051"/>
+          </a:xfrm>
+        </p:grpSpPr>
+        <p:pic>
+          <p:nvPicPr>
+            <p:cNvPr id="32" name="Picture 31">
+              <a:extLst>
+                <a:ext uri="{FF2B5EF4-FFF2-40B4-BE49-F238E27FC236}">
+                  <a16:creationId xmlns:a16="http://schemas.microsoft.com/office/drawing/2014/main" id="{D6118F5B-B32B-684C-867C-64AA1034FB75}"/>
+                </a:ext>
+              </a:extLst>
+            </p:cNvPr>
+            <p:cNvPicPr>
+              <a:picLocks noChangeAspect="1"/>
+            </p:cNvPicPr>
+            <p:nvPr/>
+          </p:nvPicPr>
+          <p:blipFill>
+            <a:blip r:embed="rId3"/>
+            <a:stretch>
+              <a:fillRect/>
+            </a:stretch>
+          </p:blipFill>
+          <p:spPr>
+            <a:xfrm>
+              <a:off x="4931963" y="4719765"/>
+              <a:ext cx="385796" cy="399371"/>
+            </a:xfrm>
+            <a:prstGeom prst="rect">
+              <a:avLst/>
+            </a:prstGeom>
+          </p:spPr>
+        </p:pic>
+        <p:sp>
+          <p:nvSpPr>
+            <p:cNvPr id="33" name="Title 4">
+              <a:extLst>
+                <a:ext uri="{FF2B5EF4-FFF2-40B4-BE49-F238E27FC236}">
+                  <a16:creationId xmlns:a16="http://schemas.microsoft.com/office/drawing/2014/main" id="{CD6B0479-B315-8644-B5AE-DCCECB0590EA}"/>
+                </a:ext>
+              </a:extLst>
+            </p:cNvPr>
+            <p:cNvSpPr txBox="1">
+              <a:spLocks/>
+            </p:cNvSpPr>
+            <p:nvPr/>
+          </p:nvSpPr>
+          <p:spPr>
+            <a:xfrm>
+              <a:off x="5342095" y="4698425"/>
+              <a:ext cx="2016851" cy="442051"/>
+            </a:xfrm>
+            <a:prstGeom prst="rect">
+              <a:avLst/>
+            </a:prstGeom>
+          </p:spPr>
+          <p:txBody>
+            <a:bodyPr vert="horz" lIns="91440" tIns="45720" rIns="91440" bIns="45720" rtlCol="0" anchor="ctr">
+              <a:noAutofit/>
+            </a:bodyPr>
+            <a:lstStyle>
+              <a:lvl1pPr algn="l" defTabSz="914400" rtl="0" eaLnBrk="1" latinLnBrk="0" hangingPunct="1">
+                <a:lnSpc>
+                  <a:spcPct val="90000"/>
+                </a:lnSpc>
+                <a:spcBef>
+                  <a:spcPct val="0"/>
+                </a:spcBef>
+                <a:buNone/>
+                <a:defRPr sz="4400" kern="1200">
+                  <a:solidFill>
+                    <a:schemeClr val="tx1"/>
+                  </a:solidFill>
+                  <a:latin typeface="+mj-lt"/>
+                  <a:ea typeface="+mj-ea"/>
+                  <a:cs typeface="+mj-cs"/>
+                </a:defRPr>
+              </a:lvl1pPr>
+            </a:lstStyle>
+            <a:p>
+              <a:pPr>
+                <a:spcBef>
+                  <a:spcPts val="2400"/>
+                </a:spcBef>
+                <a:spcAft>
+                  <a:spcPts val="2400"/>
+                </a:spcAft>
+              </a:pPr>
+              <a:r>
+                <a:rPr lang="en-GB" sz="1600" dirty="0">
+                  <a:solidFill>
+                    <a:srgbClr val="FFFFF0"/>
+                  </a:solidFill>
+                  <a:latin typeface="Avenir Book" panose="02000503020000020003" pitchFamily="2" charset="0"/>
+                </a:rPr>
+                <a:t>#OHBM2020 #OSR</a:t>
+              </a:r>
+              <a:endParaRPr lang="en-US" sz="1600" dirty="0">
+                <a:solidFill>
+                  <a:srgbClr val="FFFFF0"/>
+                </a:solidFill>
+                <a:latin typeface="Avenir Book" panose="02000503020000020003" pitchFamily="2" charset="0"/>
+              </a:endParaRPr>
+            </a:p>
+          </p:txBody>
+        </p:sp>
+      </p:grpSp>
+      <p:grpSp>
+        <p:nvGrpSpPr>
+          <p:cNvPr id="34" name="Group 33">
+            <a:extLst>
+              <a:ext uri="{FF2B5EF4-FFF2-40B4-BE49-F238E27FC236}">
+                <a16:creationId xmlns:a16="http://schemas.microsoft.com/office/drawing/2014/main" id="{12EADABF-E37A-6F41-86DC-DF7741A5FE0D}"/>
+              </a:ext>
+            </a:extLst>
+          </p:cNvPr>
+          <p:cNvGrpSpPr/>
+          <p:nvPr/>
+        </p:nvGrpSpPr>
+        <p:grpSpPr>
+          <a:xfrm>
+            <a:off x="7430947" y="6281604"/>
+            <a:ext cx="2849942" cy="399371"/>
+            <a:chOff x="7388417" y="4719765"/>
+            <a:chExt cx="2849942" cy="399371"/>
+          </a:xfrm>
+        </p:grpSpPr>
+        <p:pic>
+          <p:nvPicPr>
+            <p:cNvPr id="35" name="Picture 34">
+              <a:extLst>
+                <a:ext uri="{FF2B5EF4-FFF2-40B4-BE49-F238E27FC236}">
+                  <a16:creationId xmlns:a16="http://schemas.microsoft.com/office/drawing/2014/main" id="{B38213AA-8AEC-514F-9B87-D290D2375AEB}"/>
+                </a:ext>
+              </a:extLst>
+            </p:cNvPr>
+            <p:cNvPicPr>
+              <a:picLocks noChangeAspect="1"/>
+            </p:cNvPicPr>
+            <p:nvPr/>
+          </p:nvPicPr>
+          <p:blipFill>
+            <a:blip r:embed="rId4"/>
+            <a:stretch>
+              <a:fillRect/>
+            </a:stretch>
+          </p:blipFill>
+          <p:spPr>
+            <a:xfrm>
+              <a:off x="7388417" y="4719765"/>
+              <a:ext cx="397612" cy="399371"/>
+            </a:xfrm>
+            <a:prstGeom prst="rect">
+              <a:avLst/>
+            </a:prstGeom>
+          </p:spPr>
+        </p:pic>
+        <p:sp>
+          <p:nvSpPr>
+            <p:cNvPr id="36" name="Title 4">
+              <a:extLst>
+                <a:ext uri="{FF2B5EF4-FFF2-40B4-BE49-F238E27FC236}">
+                  <a16:creationId xmlns:a16="http://schemas.microsoft.com/office/drawing/2014/main" id="{7777849E-09B6-0542-B524-E8908AC79457}"/>
+                </a:ext>
+              </a:extLst>
+            </p:cNvPr>
+            <p:cNvSpPr txBox="1">
+              <a:spLocks/>
+            </p:cNvSpPr>
+            <p:nvPr/>
+          </p:nvSpPr>
+          <p:spPr>
+            <a:xfrm>
+              <a:off x="7795494" y="4760112"/>
+              <a:ext cx="2442865" cy="318676"/>
+            </a:xfrm>
+            <a:prstGeom prst="rect">
+              <a:avLst/>
+            </a:prstGeom>
+          </p:spPr>
+          <p:txBody>
+            <a:bodyPr vert="horz" lIns="91440" tIns="45720" rIns="91440" bIns="45720" rtlCol="0" anchor="ctr">
+              <a:noAutofit/>
+            </a:bodyPr>
+            <a:lstStyle>
+              <a:lvl1pPr algn="l" defTabSz="914400" rtl="0" eaLnBrk="1" latinLnBrk="0" hangingPunct="1">
+                <a:lnSpc>
+                  <a:spcPct val="90000"/>
+                </a:lnSpc>
+                <a:spcBef>
+                  <a:spcPct val="0"/>
+                </a:spcBef>
+                <a:buNone/>
+                <a:defRPr sz="4400" kern="1200">
+                  <a:solidFill>
+                    <a:schemeClr val="tx1"/>
+                  </a:solidFill>
+                  <a:latin typeface="+mj-lt"/>
+                  <a:ea typeface="+mj-ea"/>
+                  <a:cs typeface="+mj-cs"/>
+                </a:defRPr>
+              </a:lvl1pPr>
+            </a:lstStyle>
+            <a:p>
+              <a:pPr>
+                <a:spcBef>
+                  <a:spcPts val="2400"/>
+                </a:spcBef>
+                <a:spcAft>
+                  <a:spcPts val="2400"/>
+                </a:spcAft>
+              </a:pPr>
+              <a:r>
+                <a:rPr lang="en-GB" sz="1600" dirty="0" err="1">
+                  <a:solidFill>
+                    <a:srgbClr val="FFFFF0"/>
+                  </a:solidFill>
+                  <a:latin typeface="Avenir Book" panose="02000503020000020003" pitchFamily="2" charset="0"/>
+                </a:rPr>
+                <a:t>hbm</a:t>
+              </a:r>
+              <a:r>
+                <a:rPr lang="en-GB" sz="1600" dirty="0">
+                  <a:solidFill>
+                    <a:srgbClr val="FFFFF0"/>
+                  </a:solidFill>
+                  <a:latin typeface="Avenir Book" panose="02000503020000020003" pitchFamily="2" charset="0"/>
+                </a:rPr>
+                <a:t>-open-science-room</a:t>
+              </a:r>
+              <a:endParaRPr lang="en-US" sz="1600" dirty="0">
+                <a:solidFill>
+                  <a:srgbClr val="FFFFF0"/>
+                </a:solidFill>
+                <a:latin typeface="Avenir Book" panose="02000503020000020003" pitchFamily="2" charset="0"/>
+              </a:endParaRPr>
+            </a:p>
+          </p:txBody>
+        </p:sp>
+      </p:grpSp>
+      <p:grpSp>
+        <p:nvGrpSpPr>
+          <p:cNvPr id="37" name="Group 36">
+            <a:extLst>
+              <a:ext uri="{FF2B5EF4-FFF2-40B4-BE49-F238E27FC236}">
+                <a16:creationId xmlns:a16="http://schemas.microsoft.com/office/drawing/2014/main" id="{4BE1916E-6011-5842-B72F-03DECB50B541}"/>
+              </a:ext>
+            </a:extLst>
+          </p:cNvPr>
+          <p:cNvGrpSpPr/>
+          <p:nvPr/>
+        </p:nvGrpSpPr>
+        <p:grpSpPr>
+          <a:xfrm>
+            <a:off x="10310359" y="6292064"/>
+            <a:ext cx="2260003" cy="399371"/>
+            <a:chOff x="10267830" y="4719765"/>
+            <a:chExt cx="2260003" cy="399371"/>
+          </a:xfrm>
+        </p:grpSpPr>
+        <p:sp>
+          <p:nvSpPr>
+            <p:cNvPr id="40" name="Title 4">
+              <a:extLst>
+                <a:ext uri="{FF2B5EF4-FFF2-40B4-BE49-F238E27FC236}">
+                  <a16:creationId xmlns:a16="http://schemas.microsoft.com/office/drawing/2014/main" id="{B5E59307-82A5-3E44-84E2-9E70EC3350D9}"/>
+                </a:ext>
+              </a:extLst>
+            </p:cNvPr>
+            <p:cNvSpPr txBox="1">
+              <a:spLocks/>
+            </p:cNvSpPr>
+            <p:nvPr/>
+          </p:nvSpPr>
+          <p:spPr>
+            <a:xfrm>
+              <a:off x="10694913" y="4760112"/>
+              <a:ext cx="1832920" cy="318676"/>
+            </a:xfrm>
+            <a:prstGeom prst="rect">
+              <a:avLst/>
+            </a:prstGeom>
+          </p:spPr>
+          <p:txBody>
+            <a:bodyPr vert="horz" lIns="91440" tIns="45720" rIns="91440" bIns="45720" rtlCol="0" anchor="ctr">
+              <a:noAutofit/>
+            </a:bodyPr>
+            <a:lstStyle>
+              <a:lvl1pPr algn="l" defTabSz="914400" rtl="0" eaLnBrk="1" latinLnBrk="0" hangingPunct="1">
+                <a:lnSpc>
+                  <a:spcPct val="90000"/>
+                </a:lnSpc>
+                <a:spcBef>
+                  <a:spcPct val="0"/>
+                </a:spcBef>
+                <a:buNone/>
+                <a:defRPr sz="4400" kern="1200">
+                  <a:solidFill>
+                    <a:schemeClr val="tx1"/>
+                  </a:solidFill>
+                  <a:latin typeface="+mj-lt"/>
+                  <a:ea typeface="+mj-ea"/>
+                  <a:cs typeface="+mj-cs"/>
+                </a:defRPr>
+              </a:lvl1pPr>
+            </a:lstStyle>
+            <a:p>
+              <a:pPr>
+                <a:spcBef>
+                  <a:spcPts val="2400"/>
+                </a:spcBef>
+                <a:spcAft>
+                  <a:spcPts val="2400"/>
+                </a:spcAft>
+              </a:pPr>
+              <a:r>
+                <a:rPr lang="en-GB" sz="1600" dirty="0" err="1">
+                  <a:solidFill>
+                    <a:srgbClr val="FFFFF0"/>
+                  </a:solidFill>
+                  <a:latin typeface="Avenir Book" panose="02000503020000020003" pitchFamily="2" charset="0"/>
+                </a:rPr>
+                <a:t>osr</a:t>
+              </a:r>
+              <a:r>
+                <a:rPr lang="en-GB" sz="1600" dirty="0">
+                  <a:solidFill>
+                    <a:srgbClr val="FFFFF0"/>
+                  </a:solidFill>
+                  <a:latin typeface="Avenir Book" panose="02000503020000020003" pitchFamily="2" charset="0"/>
+                </a:rPr>
+                <a:t>-future</a:t>
+              </a:r>
+              <a:endParaRPr lang="en-US" sz="1600" dirty="0">
+                <a:solidFill>
+                  <a:srgbClr val="FFFFF0"/>
+                </a:solidFill>
+                <a:latin typeface="Avenir Book" panose="02000503020000020003" pitchFamily="2" charset="0"/>
+              </a:endParaRPr>
+            </a:p>
+          </p:txBody>
+        </p:sp>
+        <p:pic>
+          <p:nvPicPr>
+            <p:cNvPr id="41" name="Picture 40">
+              <a:extLst>
+                <a:ext uri="{FF2B5EF4-FFF2-40B4-BE49-F238E27FC236}">
+                  <a16:creationId xmlns:a16="http://schemas.microsoft.com/office/drawing/2014/main" id="{F1362206-5199-FB4D-9FE4-294A18B0A37F}"/>
+                </a:ext>
+              </a:extLst>
+            </p:cNvPr>
+            <p:cNvPicPr>
+              <a:picLocks noChangeAspect="1"/>
+            </p:cNvPicPr>
+            <p:nvPr/>
+          </p:nvPicPr>
+          <p:blipFill>
+            <a:blip r:embed="rId4"/>
+            <a:stretch>
+              <a:fillRect/>
+            </a:stretch>
+          </p:blipFill>
+          <p:spPr>
+            <a:xfrm>
+              <a:off x="10267830" y="4719765"/>
+              <a:ext cx="397612" cy="399371"/>
+            </a:xfrm>
+            <a:prstGeom prst="rect">
+              <a:avLst/>
+            </a:prstGeom>
+          </p:spPr>
+        </p:pic>
+      </p:grpSp>
+      <p:grpSp>
+        <p:nvGrpSpPr>
+          <p:cNvPr id="48" name="Group 47">
+            <a:extLst>
+              <a:ext uri="{FF2B5EF4-FFF2-40B4-BE49-F238E27FC236}">
+                <a16:creationId xmlns:a16="http://schemas.microsoft.com/office/drawing/2014/main" id="{99D8A776-DF52-8B45-87C8-791A05F1E95E}"/>
+              </a:ext>
+            </a:extLst>
+          </p:cNvPr>
+          <p:cNvGrpSpPr/>
+          <p:nvPr/>
+        </p:nvGrpSpPr>
+        <p:grpSpPr>
+          <a:xfrm>
+            <a:off x="163038" y="6287880"/>
+            <a:ext cx="2864747" cy="429351"/>
+            <a:chOff x="46077" y="4704775"/>
+            <a:chExt cx="2864747" cy="429351"/>
+          </a:xfrm>
+        </p:grpSpPr>
+        <p:pic>
+          <p:nvPicPr>
+            <p:cNvPr id="49" name="Picture 48">
+              <a:extLst>
+                <a:ext uri="{FF2B5EF4-FFF2-40B4-BE49-F238E27FC236}">
+                  <a16:creationId xmlns:a16="http://schemas.microsoft.com/office/drawing/2014/main" id="{B9E1084F-F6D4-8C48-8337-97C970FC405A}"/>
+                </a:ext>
+              </a:extLst>
+            </p:cNvPr>
+            <p:cNvPicPr>
+              <a:picLocks noChangeAspect="1"/>
+            </p:cNvPicPr>
+            <p:nvPr/>
+          </p:nvPicPr>
+          <p:blipFill>
+            <a:blip r:embed="rId5"/>
+            <a:stretch>
+              <a:fillRect/>
+            </a:stretch>
+          </p:blipFill>
+          <p:spPr>
+            <a:xfrm>
+              <a:off x="46077" y="4730571"/>
+              <a:ext cx="377759" cy="377759"/>
+            </a:xfrm>
+            <a:prstGeom prst="rect">
+              <a:avLst/>
+            </a:prstGeom>
+          </p:spPr>
+        </p:pic>
+        <p:sp>
+          <p:nvSpPr>
+            <p:cNvPr id="50" name="Title 4">
+              <a:extLst>
+                <a:ext uri="{FF2B5EF4-FFF2-40B4-BE49-F238E27FC236}">
+                  <a16:creationId xmlns:a16="http://schemas.microsoft.com/office/drawing/2014/main" id="{EFD75409-F233-3E4C-965E-844656DC236F}"/>
+                </a:ext>
+              </a:extLst>
+            </p:cNvPr>
+            <p:cNvSpPr txBox="1">
+              <a:spLocks/>
+            </p:cNvSpPr>
+            <p:nvPr/>
+          </p:nvSpPr>
+          <p:spPr>
+            <a:xfrm>
+              <a:off x="443201" y="4704775"/>
+              <a:ext cx="2467623" cy="429351"/>
+            </a:xfrm>
+            <a:prstGeom prst="rect">
+              <a:avLst/>
+            </a:prstGeom>
+          </p:spPr>
+          <p:txBody>
+            <a:bodyPr vert="horz" lIns="91440" tIns="45720" rIns="91440" bIns="45720" rtlCol="0" anchor="ctr">
+              <a:noAutofit/>
+            </a:bodyPr>
+            <a:lstStyle>
+              <a:lvl1pPr algn="l" defTabSz="914400" rtl="0" eaLnBrk="1" latinLnBrk="0" hangingPunct="1">
+                <a:lnSpc>
+                  <a:spcPct val="90000"/>
+                </a:lnSpc>
+                <a:spcBef>
+                  <a:spcPct val="0"/>
+                </a:spcBef>
+                <a:buNone/>
+                <a:defRPr sz="4400" kern="1200">
+                  <a:solidFill>
+                    <a:schemeClr val="tx1"/>
+                  </a:solidFill>
+                  <a:latin typeface="+mj-lt"/>
+                  <a:ea typeface="+mj-ea"/>
+                  <a:cs typeface="+mj-cs"/>
+                </a:defRPr>
+              </a:lvl1pPr>
+            </a:lstStyle>
+            <a:p>
+              <a:pPr>
+                <a:spcBef>
+                  <a:spcPts val="2400"/>
+                </a:spcBef>
+                <a:spcAft>
+                  <a:spcPts val="2400"/>
+                </a:spcAft>
+              </a:pPr>
+              <a:r>
+                <a:rPr lang="en-GB" sz="1600" dirty="0" err="1">
+                  <a:solidFill>
+                    <a:srgbClr val="FFFFF0"/>
+                  </a:solidFill>
+                  <a:latin typeface="Avenir Book" panose="02000503020000020003" pitchFamily="2" charset="0"/>
+                </a:rPr>
+                <a:t>ohbm.github.io</a:t>
+              </a:r>
+              <a:r>
+                <a:rPr lang="en-GB" sz="1600" dirty="0">
+                  <a:solidFill>
+                    <a:srgbClr val="FFFFF0"/>
+                  </a:solidFill>
+                  <a:latin typeface="Avenir Book" panose="02000503020000020003" pitchFamily="2" charset="0"/>
+                </a:rPr>
+                <a:t>/osr2020</a:t>
+              </a:r>
+              <a:endParaRPr lang="en-US" sz="1600" dirty="0">
+                <a:solidFill>
+                  <a:srgbClr val="FFFFF0"/>
+                </a:solidFill>
+                <a:latin typeface="Avenir Book" panose="02000503020000020003" pitchFamily="2" charset="0"/>
+              </a:endParaRPr>
+            </a:p>
+          </p:txBody>
+        </p:sp>
+      </p:grpSp>
+      <p:pic>
+        <p:nvPicPr>
+          <p:cNvPr id="5" name="Picture 4">
+            <a:extLst>
+              <a:ext uri="{FF2B5EF4-FFF2-40B4-BE49-F238E27FC236}">
+                <a16:creationId xmlns:a16="http://schemas.microsoft.com/office/drawing/2014/main" id="{D221A32B-E59C-B844-917B-8F414B09E3AB}"/>
+              </a:ext>
+            </a:extLst>
+          </p:cNvPr>
+          <p:cNvPicPr>
+            <a:picLocks noChangeAspect="1"/>
+          </p:cNvPicPr>
+          <p:nvPr/>
+        </p:nvPicPr>
+        <p:blipFill rotWithShape="1">
+          <a:blip r:embed="rId6"/>
+          <a:srcRect l="5024" t="4838" r="5024" b="5133"/>
+          <a:stretch/>
+        </p:blipFill>
+        <p:spPr>
+          <a:xfrm>
+            <a:off x="-10635" y="-10634"/>
+            <a:ext cx="12200486" cy="6868633"/>
+          </a:xfrm>
+          <a:prstGeom prst="rect">
+            <a:avLst/>
+          </a:prstGeom>
+        </p:spPr>
+      </p:pic>
+    </p:spTree>
+    <p:extLst>
+      <p:ext uri="{BB962C8B-B14F-4D97-AF65-F5344CB8AC3E}">
+        <p14:creationId xmlns:p14="http://schemas.microsoft.com/office/powerpoint/2010/main" val="3015170713"/>
+      </p:ext>
+    </p:extLst>
+  </p:cSld>
+  <p:clrMapOvr>
+    <a:masterClrMapping/>
+  </p:clrMapOvr>
+</p:sld>
+</file>
+
+<file path=ppt/slides/slide49.xml><?xml version="1.0" encoding="utf-8"?>
 <p:sld xmlns:a="http://schemas.openxmlformats.org/drawingml/2006/main" xmlns:r="http://schemas.openxmlformats.org/officeDocument/2006/relationships" xmlns:p="http://schemas.openxmlformats.org/presentationml/2006/main">
   <p:cSld>
     <p:spTree>
@@ -45516,1174 +46724,6 @@
 </p:sld>
 </file>
 
-<file path=ppt/slides/slide49.xml><?xml version="1.0" encoding="utf-8"?>
-<p:sld xmlns:a="http://schemas.openxmlformats.org/drawingml/2006/main" xmlns:r="http://schemas.openxmlformats.org/officeDocument/2006/relationships" xmlns:p="http://schemas.openxmlformats.org/presentationml/2006/main">
-  <p:cSld>
-    <p:spTree>
-      <p:nvGrpSpPr>
-        <p:cNvPr id="1" name=""/>
-        <p:cNvGrpSpPr/>
-        <p:nvPr/>
-      </p:nvGrpSpPr>
-      <p:grpSpPr>
-        <a:xfrm>
-          <a:off x="0" y="0"/>
-          <a:ext cx="0" cy="0"/>
-          <a:chOff x="0" y="0"/>
-          <a:chExt cx="0" cy="0"/>
-        </a:xfrm>
-      </p:grpSpPr>
-      <p:sp>
-        <p:nvSpPr>
-          <p:cNvPr id="11" name="Rectangle 10">
-            <a:extLst>
-              <a:ext uri="{FF2B5EF4-FFF2-40B4-BE49-F238E27FC236}">
-                <a16:creationId xmlns:a16="http://schemas.microsoft.com/office/drawing/2014/main" id="{370F5D13-40E0-3E47-83EC-F117AB5C8BFC}"/>
-              </a:ext>
-            </a:extLst>
-          </p:cNvPr>
-          <p:cNvSpPr/>
-          <p:nvPr/>
-        </p:nvSpPr>
-        <p:spPr>
-          <a:xfrm>
-            <a:off x="-10633" y="-10633"/>
-            <a:ext cx="12213266" cy="5448397"/>
-          </a:xfrm>
-          <a:prstGeom prst="rect">
-            <a:avLst/>
-          </a:prstGeom>
-          <a:solidFill>
-            <a:srgbClr val="004E63"/>
-          </a:solidFill>
-          <a:ln>
-            <a:noFill/>
-          </a:ln>
-        </p:spPr>
-        <p:style>
-          <a:lnRef idx="2">
-            <a:schemeClr val="accent1">
-              <a:shade val="50000"/>
-            </a:schemeClr>
-          </a:lnRef>
-          <a:fillRef idx="1">
-            <a:schemeClr val="accent1"/>
-          </a:fillRef>
-          <a:effectRef idx="0">
-            <a:schemeClr val="accent1"/>
-          </a:effectRef>
-          <a:fontRef idx="minor">
-            <a:schemeClr val="lt1"/>
-          </a:fontRef>
-        </p:style>
-        <p:txBody>
-          <a:bodyPr rot="0" spcFirstLastPara="0" vertOverflow="overflow" horzOverflow="overflow" vert="horz" wrap="square" lIns="91440" tIns="45720" rIns="91440" bIns="45720" numCol="1" spcCol="0" rtlCol="0" fromWordArt="0" anchor="ctr" anchorCtr="0" forceAA="0" compatLnSpc="1">
-            <a:prstTxWarp prst="textNoShape">
-              <a:avLst/>
-            </a:prstTxWarp>
-            <a:noAutofit/>
-          </a:bodyPr>
-          <a:lstStyle/>
-          <a:p>
-            <a:pPr algn="ctr"/>
-            <a:endParaRPr lang="en-US" dirty="0">
-              <a:highlight>
-                <a:srgbClr val="004E63"/>
-              </a:highlight>
-            </a:endParaRPr>
-          </a:p>
-        </p:txBody>
-      </p:sp>
-      <p:grpSp>
-        <p:nvGrpSpPr>
-          <p:cNvPr id="27" name="Group 26">
-            <a:extLst>
-              <a:ext uri="{FF2B5EF4-FFF2-40B4-BE49-F238E27FC236}">
-                <a16:creationId xmlns:a16="http://schemas.microsoft.com/office/drawing/2014/main" id="{EA249572-7EE9-E340-AE36-2BE393DF181D}"/>
-              </a:ext>
-            </a:extLst>
-          </p:cNvPr>
-          <p:cNvGrpSpPr/>
-          <p:nvPr/>
-        </p:nvGrpSpPr>
-        <p:grpSpPr>
-          <a:xfrm>
-            <a:off x="204923" y="5265127"/>
-            <a:ext cx="11782153" cy="1497533"/>
-            <a:chOff x="87743" y="-173110"/>
-            <a:chExt cx="11782153" cy="1497533"/>
-          </a:xfrm>
-        </p:grpSpPr>
-        <p:pic>
-          <p:nvPicPr>
-            <p:cNvPr id="4" name="Picture 3">
-              <a:extLst>
-                <a:ext uri="{FF2B5EF4-FFF2-40B4-BE49-F238E27FC236}">
-                  <a16:creationId xmlns:a16="http://schemas.microsoft.com/office/drawing/2014/main" id="{193B5A88-2D72-5D4A-B4ED-9B4519FECFA6}"/>
-                </a:ext>
-              </a:extLst>
-            </p:cNvPr>
-            <p:cNvPicPr>
-              <a:picLocks noChangeAspect="1"/>
-            </p:cNvPicPr>
-            <p:nvPr/>
-          </p:nvPicPr>
-          <p:blipFill>
-            <a:blip r:embed="rId3"/>
-            <a:stretch>
-              <a:fillRect/>
-            </a:stretch>
-          </p:blipFill>
-          <p:spPr>
-            <a:xfrm>
-              <a:off x="8724823" y="870532"/>
-              <a:ext cx="3145073" cy="453891"/>
-            </a:xfrm>
-            <a:prstGeom prst="rect">
-              <a:avLst/>
-            </a:prstGeom>
-          </p:spPr>
-        </p:pic>
-        <p:pic>
-          <p:nvPicPr>
-            <p:cNvPr id="6" name="Picture 5">
-              <a:extLst>
-                <a:ext uri="{FF2B5EF4-FFF2-40B4-BE49-F238E27FC236}">
-                  <a16:creationId xmlns:a16="http://schemas.microsoft.com/office/drawing/2014/main" id="{556E9061-DE60-1443-B08E-F1771F7A456A}"/>
-                </a:ext>
-              </a:extLst>
-            </p:cNvPr>
-            <p:cNvPicPr>
-              <a:picLocks noChangeAspect="1"/>
-            </p:cNvPicPr>
-            <p:nvPr/>
-          </p:nvPicPr>
-          <p:blipFill>
-            <a:blip r:embed="rId4"/>
-            <a:stretch>
-              <a:fillRect/>
-            </a:stretch>
-          </p:blipFill>
-          <p:spPr>
-            <a:xfrm>
-              <a:off x="6539652" y="473094"/>
-              <a:ext cx="1452303" cy="812713"/>
-            </a:xfrm>
-            <a:prstGeom prst="rect">
-              <a:avLst/>
-            </a:prstGeom>
-          </p:spPr>
-        </p:pic>
-        <p:pic>
-          <p:nvPicPr>
-            <p:cNvPr id="10" name="Picture 9">
-              <a:extLst>
-                <a:ext uri="{FF2B5EF4-FFF2-40B4-BE49-F238E27FC236}">
-                  <a16:creationId xmlns:a16="http://schemas.microsoft.com/office/drawing/2014/main" id="{65C6A7F9-843E-EE48-A7F4-3451C9B81CA5}"/>
-                </a:ext>
-              </a:extLst>
-            </p:cNvPr>
-            <p:cNvPicPr>
-              <a:picLocks noChangeAspect="1"/>
-            </p:cNvPicPr>
-            <p:nvPr/>
-          </p:nvPicPr>
-          <p:blipFill>
-            <a:blip r:embed="rId5"/>
-            <a:stretch>
-              <a:fillRect/>
-            </a:stretch>
-          </p:blipFill>
-          <p:spPr>
-            <a:xfrm>
-              <a:off x="8121685" y="-173110"/>
-              <a:ext cx="3145073" cy="1155197"/>
-            </a:xfrm>
-            <a:prstGeom prst="rect">
-              <a:avLst/>
-            </a:prstGeom>
-          </p:spPr>
-        </p:pic>
-        <p:pic>
-          <p:nvPicPr>
-            <p:cNvPr id="14" name="Picture 13">
-              <a:extLst>
-                <a:ext uri="{FF2B5EF4-FFF2-40B4-BE49-F238E27FC236}">
-                  <a16:creationId xmlns:a16="http://schemas.microsoft.com/office/drawing/2014/main" id="{09D3B546-A78F-564E-81E4-E18D87AD67BB}"/>
-                </a:ext>
-              </a:extLst>
-            </p:cNvPr>
-            <p:cNvPicPr>
-              <a:picLocks noChangeAspect="1"/>
-            </p:cNvPicPr>
-            <p:nvPr/>
-          </p:nvPicPr>
-          <p:blipFill>
-            <a:blip r:embed="rId6"/>
-            <a:stretch>
-              <a:fillRect/>
-            </a:stretch>
-          </p:blipFill>
-          <p:spPr>
-            <a:xfrm>
-              <a:off x="3918931" y="269232"/>
-              <a:ext cx="2427006" cy="766423"/>
-            </a:xfrm>
-            <a:prstGeom prst="rect">
-              <a:avLst/>
-            </a:prstGeom>
-          </p:spPr>
-        </p:pic>
-        <p:pic>
-          <p:nvPicPr>
-            <p:cNvPr id="23" name="Picture 22">
-              <a:extLst>
-                <a:ext uri="{FF2B5EF4-FFF2-40B4-BE49-F238E27FC236}">
-                  <a16:creationId xmlns:a16="http://schemas.microsoft.com/office/drawing/2014/main" id="{71D7F83A-8338-0445-B8DF-3D9EC7A7C1FF}"/>
-                </a:ext>
-              </a:extLst>
-            </p:cNvPr>
-            <p:cNvPicPr>
-              <a:picLocks noChangeAspect="1"/>
-            </p:cNvPicPr>
-            <p:nvPr/>
-          </p:nvPicPr>
-          <p:blipFill>
-            <a:blip r:embed="rId7"/>
-            <a:stretch>
-              <a:fillRect/>
-            </a:stretch>
-          </p:blipFill>
-          <p:spPr>
-            <a:xfrm>
-              <a:off x="87743" y="146216"/>
-              <a:ext cx="1452302" cy="1118350"/>
-            </a:xfrm>
-            <a:prstGeom prst="rect">
-              <a:avLst/>
-            </a:prstGeom>
-          </p:spPr>
-        </p:pic>
-        <p:pic>
-          <p:nvPicPr>
-            <p:cNvPr id="19" name="Picture 18">
-              <a:extLst>
-                <a:ext uri="{FF2B5EF4-FFF2-40B4-BE49-F238E27FC236}">
-                  <a16:creationId xmlns:a16="http://schemas.microsoft.com/office/drawing/2014/main" id="{3610D2C6-15F2-3B4A-8313-010132646781}"/>
-                </a:ext>
-              </a:extLst>
-            </p:cNvPr>
-            <p:cNvPicPr>
-              <a:picLocks noChangeAspect="1"/>
-            </p:cNvPicPr>
-            <p:nvPr/>
-          </p:nvPicPr>
-          <p:blipFill>
-            <a:blip r:embed="rId8"/>
-            <a:stretch>
-              <a:fillRect/>
-            </a:stretch>
-          </p:blipFill>
-          <p:spPr>
-            <a:xfrm>
-              <a:off x="1448605" y="366406"/>
-              <a:ext cx="2298618" cy="751471"/>
-            </a:xfrm>
-            <a:prstGeom prst="rect">
-              <a:avLst/>
-            </a:prstGeom>
-          </p:spPr>
-        </p:pic>
-      </p:grpSp>
-      <p:pic>
-        <p:nvPicPr>
-          <p:cNvPr id="40" name="Picture 39">
-            <a:extLst>
-              <a:ext uri="{FF2B5EF4-FFF2-40B4-BE49-F238E27FC236}">
-                <a16:creationId xmlns:a16="http://schemas.microsoft.com/office/drawing/2014/main" id="{6936BE48-C50B-B64F-8D8F-FB595F5E7CD1}"/>
-              </a:ext>
-            </a:extLst>
-          </p:cNvPr>
-          <p:cNvPicPr>
-            <a:picLocks noChangeAspect="1"/>
-          </p:cNvPicPr>
-          <p:nvPr/>
-        </p:nvPicPr>
-        <p:blipFill rotWithShape="1">
-          <a:blip r:embed="rId9"/>
-          <a:srcRect b="8869"/>
-          <a:stretch/>
-        </p:blipFill>
-        <p:spPr>
-          <a:xfrm>
-            <a:off x="8210819" y="90659"/>
-            <a:ext cx="3877941" cy="1605988"/>
-          </a:xfrm>
-          <a:prstGeom prst="rect">
-            <a:avLst/>
-          </a:prstGeom>
-        </p:spPr>
-      </p:pic>
-      <p:sp>
-        <p:nvSpPr>
-          <p:cNvPr id="30" name="Title 4">
-            <a:extLst>
-              <a:ext uri="{FF2B5EF4-FFF2-40B4-BE49-F238E27FC236}">
-                <a16:creationId xmlns:a16="http://schemas.microsoft.com/office/drawing/2014/main" id="{B680D021-4789-6447-BE2C-0CB0936738DD}"/>
-              </a:ext>
-            </a:extLst>
-          </p:cNvPr>
-          <p:cNvSpPr>
-            <a:spLocks noGrp="1"/>
-          </p:cNvSpPr>
-          <p:nvPr>
-            <p:ph type="title"/>
-          </p:nvPr>
-        </p:nvSpPr>
-        <p:spPr>
-          <a:xfrm>
-            <a:off x="820376" y="1903271"/>
-            <a:ext cx="11166699" cy="1065270"/>
-          </a:xfrm>
-        </p:spPr>
-        <p:txBody>
-          <a:bodyPr anchor="b">
-            <a:noAutofit/>
-          </a:bodyPr>
-          <a:lstStyle/>
-          <a:p>
-            <a:pPr>
-              <a:spcBef>
-                <a:spcPts val="2400"/>
-              </a:spcBef>
-              <a:spcAft>
-                <a:spcPts val="2400"/>
-              </a:spcAft>
-            </a:pPr>
-            <a:r>
-              <a:rPr lang="en-GB" b="1" dirty="0">
-                <a:solidFill>
-                  <a:srgbClr val="FFFFF0"/>
-                </a:solidFill>
-                <a:latin typeface="Avenir Book" panose="02000503020000020003" pitchFamily="2" charset="0"/>
-              </a:rPr>
-              <a:t>Past, Present and Future of Neuroimaging: Demonstrations</a:t>
-            </a:r>
-            <a:endParaRPr lang="en-US" b="1" dirty="0">
-              <a:solidFill>
-                <a:srgbClr val="FFFFF0"/>
-              </a:solidFill>
-              <a:latin typeface="Avenir Book" panose="02000503020000020003" pitchFamily="2" charset="0"/>
-            </a:endParaRPr>
-          </a:p>
-        </p:txBody>
-      </p:sp>
-      <p:cxnSp>
-        <p:nvCxnSpPr>
-          <p:cNvPr id="31" name="Straight Connector 30">
-            <a:extLst>
-              <a:ext uri="{FF2B5EF4-FFF2-40B4-BE49-F238E27FC236}">
-                <a16:creationId xmlns:a16="http://schemas.microsoft.com/office/drawing/2014/main" id="{69311614-B7AF-2F4B-B24D-56234D21D363}"/>
-              </a:ext>
-            </a:extLst>
-          </p:cNvPr>
-          <p:cNvCxnSpPr>
-            <a:cxnSpLocks/>
-          </p:cNvCxnSpPr>
-          <p:nvPr/>
-        </p:nvCxnSpPr>
-        <p:spPr>
-          <a:xfrm>
-            <a:off x="550927" y="1462768"/>
-            <a:ext cx="0" cy="2230043"/>
-          </a:xfrm>
-          <a:prstGeom prst="line">
-            <a:avLst/>
-          </a:prstGeom>
-          <a:noFill/>
-          <a:ln w="76200" cap="flat">
-            <a:solidFill>
-              <a:srgbClr val="FFFFF0"/>
-            </a:solidFill>
-            <a:prstDash val="solid"/>
-            <a:miter lim="400000"/>
-          </a:ln>
-          <a:effectLst/>
-          <a:sp3d/>
-        </p:spPr>
-        <p:style>
-          <a:lnRef idx="0">
-            <a:scrgbClr r="0" g="0" b="0"/>
-          </a:lnRef>
-          <a:fillRef idx="0">
-            <a:scrgbClr r="0" g="0" b="0"/>
-          </a:fillRef>
-          <a:effectRef idx="0">
-            <a:scrgbClr r="0" g="0" b="0"/>
-          </a:effectRef>
-          <a:fontRef idx="none"/>
-        </p:style>
-      </p:cxnSp>
-      <p:sp>
-        <p:nvSpPr>
-          <p:cNvPr id="32" name="Title 4">
-            <a:extLst>
-              <a:ext uri="{FF2B5EF4-FFF2-40B4-BE49-F238E27FC236}">
-                <a16:creationId xmlns:a16="http://schemas.microsoft.com/office/drawing/2014/main" id="{5F820F38-0020-A446-A78E-6A1DABABEEB3}"/>
-              </a:ext>
-            </a:extLst>
-          </p:cNvPr>
-          <p:cNvSpPr txBox="1">
-            <a:spLocks/>
-          </p:cNvSpPr>
-          <p:nvPr/>
-        </p:nvSpPr>
-        <p:spPr>
-          <a:xfrm>
-            <a:off x="887828" y="2604832"/>
-            <a:ext cx="8224454" cy="1065270"/>
-          </a:xfrm>
-          <a:prstGeom prst="rect">
-            <a:avLst/>
-          </a:prstGeom>
-        </p:spPr>
-        <p:txBody>
-          <a:bodyPr vert="horz" lIns="91440" tIns="45720" rIns="91440" bIns="45720" rtlCol="0" anchor="b">
-            <a:noAutofit/>
-          </a:bodyPr>
-          <a:lstStyle>
-            <a:lvl1pPr algn="l" defTabSz="914400" rtl="0" eaLnBrk="1" latinLnBrk="0" hangingPunct="1">
-              <a:lnSpc>
-                <a:spcPct val="90000"/>
-              </a:lnSpc>
-              <a:spcBef>
-                <a:spcPct val="0"/>
-              </a:spcBef>
-              <a:buNone/>
-              <a:defRPr sz="4400" kern="1200">
-                <a:solidFill>
-                  <a:schemeClr val="tx1"/>
-                </a:solidFill>
-                <a:latin typeface="+mj-lt"/>
-                <a:ea typeface="+mj-ea"/>
-                <a:cs typeface="+mj-cs"/>
-              </a:defRPr>
-            </a:lvl1pPr>
-          </a:lstStyle>
-          <a:p>
-            <a:pPr>
-              <a:spcBef>
-                <a:spcPts val="2400"/>
-              </a:spcBef>
-              <a:spcAft>
-                <a:spcPts val="2400"/>
-              </a:spcAft>
-            </a:pPr>
-            <a:r>
-              <a:rPr lang="en-GB" sz="3600" b="1" dirty="0">
-                <a:solidFill>
-                  <a:srgbClr val="FFFFF0"/>
-                </a:solidFill>
-                <a:latin typeface="Avenir Book" panose="02000503020000020003" pitchFamily="2" charset="0"/>
-              </a:rPr>
-              <a:t>Thursday 25</a:t>
-            </a:r>
-            <a:r>
-              <a:rPr lang="en-GB" sz="3600" b="1" baseline="30000" dirty="0">
-                <a:solidFill>
-                  <a:srgbClr val="FFFFF0"/>
-                </a:solidFill>
-                <a:latin typeface="Avenir Book" panose="02000503020000020003" pitchFamily="2" charset="0"/>
-              </a:rPr>
-              <a:t>th</a:t>
-            </a:r>
-            <a:r>
-              <a:rPr lang="en-GB" sz="3600" b="1" dirty="0">
-                <a:solidFill>
-                  <a:srgbClr val="FFFFF0"/>
-                </a:solidFill>
-                <a:latin typeface="Avenir Book" panose="02000503020000020003" pitchFamily="2" charset="0"/>
-              </a:rPr>
-              <a:t> June</a:t>
-            </a:r>
-            <a:endParaRPr lang="en-US" sz="3600" b="1" dirty="0">
-              <a:solidFill>
-                <a:srgbClr val="FFFFF0"/>
-              </a:solidFill>
-              <a:latin typeface="Avenir Book" panose="02000503020000020003" pitchFamily="2" charset="0"/>
-            </a:endParaRPr>
-          </a:p>
-        </p:txBody>
-      </p:sp>
-      <p:grpSp>
-        <p:nvGrpSpPr>
-          <p:cNvPr id="37" name="Group 36">
-            <a:extLst>
-              <a:ext uri="{FF2B5EF4-FFF2-40B4-BE49-F238E27FC236}">
-                <a16:creationId xmlns:a16="http://schemas.microsoft.com/office/drawing/2014/main" id="{6C6A5B1F-817D-0740-934D-E55860F56CFF}"/>
-              </a:ext>
-            </a:extLst>
-          </p:cNvPr>
-          <p:cNvGrpSpPr/>
-          <p:nvPr/>
-        </p:nvGrpSpPr>
-        <p:grpSpPr>
-          <a:xfrm>
-            <a:off x="2955183" y="4704775"/>
-            <a:ext cx="1916953" cy="429351"/>
-            <a:chOff x="2838223" y="4704775"/>
-            <a:chExt cx="1916953" cy="429351"/>
-          </a:xfrm>
-        </p:grpSpPr>
-        <p:pic>
-          <p:nvPicPr>
-            <p:cNvPr id="41" name="Picture 40">
-              <a:extLst>
-                <a:ext uri="{FF2B5EF4-FFF2-40B4-BE49-F238E27FC236}">
-                  <a16:creationId xmlns:a16="http://schemas.microsoft.com/office/drawing/2014/main" id="{3DE3BDF7-3930-B342-9A85-AD87934F6987}"/>
-                </a:ext>
-              </a:extLst>
-            </p:cNvPr>
-            <p:cNvPicPr>
-              <a:picLocks noChangeAspect="1"/>
-            </p:cNvPicPr>
-            <p:nvPr/>
-          </p:nvPicPr>
-          <p:blipFill>
-            <a:blip r:embed="rId10"/>
-            <a:stretch>
-              <a:fillRect/>
-            </a:stretch>
-          </p:blipFill>
-          <p:spPr>
-            <a:xfrm>
-              <a:off x="2838223" y="4719765"/>
-              <a:ext cx="385796" cy="399371"/>
-            </a:xfrm>
-            <a:prstGeom prst="rect">
-              <a:avLst/>
-            </a:prstGeom>
-          </p:spPr>
-        </p:pic>
-        <p:sp>
-          <p:nvSpPr>
-            <p:cNvPr id="48" name="Title 4">
-              <a:extLst>
-                <a:ext uri="{FF2B5EF4-FFF2-40B4-BE49-F238E27FC236}">
-                  <a16:creationId xmlns:a16="http://schemas.microsoft.com/office/drawing/2014/main" id="{EA54FF2B-9779-C94E-8234-2132DDD38B66}"/>
-                </a:ext>
-              </a:extLst>
-            </p:cNvPr>
-            <p:cNvSpPr txBox="1">
-              <a:spLocks/>
-            </p:cNvSpPr>
-            <p:nvPr/>
-          </p:nvSpPr>
-          <p:spPr>
-            <a:xfrm>
-              <a:off x="3236024" y="4704775"/>
-              <a:ext cx="1519152" cy="429351"/>
-            </a:xfrm>
-            <a:prstGeom prst="rect">
-              <a:avLst/>
-            </a:prstGeom>
-          </p:spPr>
-          <p:txBody>
-            <a:bodyPr vert="horz" lIns="91440" tIns="45720" rIns="91440" bIns="45720" rtlCol="0" anchor="ctr">
-              <a:noAutofit/>
-            </a:bodyPr>
-            <a:lstStyle>
-              <a:lvl1pPr algn="l" defTabSz="914400" rtl="0" eaLnBrk="1" latinLnBrk="0" hangingPunct="1">
-                <a:lnSpc>
-                  <a:spcPct val="90000"/>
-                </a:lnSpc>
-                <a:spcBef>
-                  <a:spcPct val="0"/>
-                </a:spcBef>
-                <a:buNone/>
-                <a:defRPr sz="4400" kern="1200">
-                  <a:solidFill>
-                    <a:schemeClr val="tx1"/>
-                  </a:solidFill>
-                  <a:latin typeface="+mj-lt"/>
-                  <a:ea typeface="+mj-ea"/>
-                  <a:cs typeface="+mj-cs"/>
-                </a:defRPr>
-              </a:lvl1pPr>
-            </a:lstStyle>
-            <a:p>
-              <a:pPr>
-                <a:spcBef>
-                  <a:spcPts val="2400"/>
-                </a:spcBef>
-                <a:spcAft>
-                  <a:spcPts val="2400"/>
-                </a:spcAft>
-              </a:pPr>
-              <a:r>
-                <a:rPr lang="en-GB" sz="1600" dirty="0">
-                  <a:solidFill>
-                    <a:srgbClr val="FFFFF0"/>
-                  </a:solidFill>
-                  <a:latin typeface="Avenir Book" panose="02000503020000020003" pitchFamily="2" charset="0"/>
-                </a:rPr>
-                <a:t>@</a:t>
-              </a:r>
-              <a:r>
-                <a:rPr lang="en-GB" sz="1600" dirty="0" err="1">
-                  <a:solidFill>
-                    <a:srgbClr val="FFFFF0"/>
-                  </a:solidFill>
-                  <a:latin typeface="Avenir Book" panose="02000503020000020003" pitchFamily="2" charset="0"/>
-                </a:rPr>
-                <a:t>OHBMOpen</a:t>
-              </a:r>
-              <a:endParaRPr lang="en-US" sz="1600" dirty="0">
-                <a:solidFill>
-                  <a:srgbClr val="FFFFF0"/>
-                </a:solidFill>
-                <a:latin typeface="Avenir Book" panose="02000503020000020003" pitchFamily="2" charset="0"/>
-              </a:endParaRPr>
-            </a:p>
-          </p:txBody>
-        </p:sp>
-      </p:grpSp>
-      <p:grpSp>
-        <p:nvGrpSpPr>
-          <p:cNvPr id="49" name="Group 48">
-            <a:extLst>
-              <a:ext uri="{FF2B5EF4-FFF2-40B4-BE49-F238E27FC236}">
-                <a16:creationId xmlns:a16="http://schemas.microsoft.com/office/drawing/2014/main" id="{0FE406E7-492B-8241-B497-FAD92A2DDDF6}"/>
-              </a:ext>
-            </a:extLst>
-          </p:cNvPr>
-          <p:cNvGrpSpPr/>
-          <p:nvPr/>
-        </p:nvGrpSpPr>
-        <p:grpSpPr>
-          <a:xfrm>
-            <a:off x="4931963" y="4698425"/>
-            <a:ext cx="2426983" cy="442051"/>
-            <a:chOff x="4931963" y="4698425"/>
-            <a:chExt cx="2426983" cy="442051"/>
-          </a:xfrm>
-        </p:grpSpPr>
-        <p:pic>
-          <p:nvPicPr>
-            <p:cNvPr id="50" name="Picture 49">
-              <a:extLst>
-                <a:ext uri="{FF2B5EF4-FFF2-40B4-BE49-F238E27FC236}">
-                  <a16:creationId xmlns:a16="http://schemas.microsoft.com/office/drawing/2014/main" id="{E50FF467-6681-BD45-B3BA-D4BA6FDDA11A}"/>
-                </a:ext>
-              </a:extLst>
-            </p:cNvPr>
-            <p:cNvPicPr>
-              <a:picLocks noChangeAspect="1"/>
-            </p:cNvPicPr>
-            <p:nvPr/>
-          </p:nvPicPr>
-          <p:blipFill>
-            <a:blip r:embed="rId10"/>
-            <a:stretch>
-              <a:fillRect/>
-            </a:stretch>
-          </p:blipFill>
-          <p:spPr>
-            <a:xfrm>
-              <a:off x="4931963" y="4719765"/>
-              <a:ext cx="385796" cy="399371"/>
-            </a:xfrm>
-            <a:prstGeom prst="rect">
-              <a:avLst/>
-            </a:prstGeom>
-          </p:spPr>
-        </p:pic>
-        <p:sp>
-          <p:nvSpPr>
-            <p:cNvPr id="51" name="Title 4">
-              <a:extLst>
-                <a:ext uri="{FF2B5EF4-FFF2-40B4-BE49-F238E27FC236}">
-                  <a16:creationId xmlns:a16="http://schemas.microsoft.com/office/drawing/2014/main" id="{F97B9BDD-34FC-1E4E-A1DF-6BA2B30145F9}"/>
-                </a:ext>
-              </a:extLst>
-            </p:cNvPr>
-            <p:cNvSpPr txBox="1">
-              <a:spLocks/>
-            </p:cNvSpPr>
-            <p:nvPr/>
-          </p:nvSpPr>
-          <p:spPr>
-            <a:xfrm>
-              <a:off x="5342095" y="4698425"/>
-              <a:ext cx="2016851" cy="442051"/>
-            </a:xfrm>
-            <a:prstGeom prst="rect">
-              <a:avLst/>
-            </a:prstGeom>
-          </p:spPr>
-          <p:txBody>
-            <a:bodyPr vert="horz" lIns="91440" tIns="45720" rIns="91440" bIns="45720" rtlCol="0" anchor="ctr">
-              <a:noAutofit/>
-            </a:bodyPr>
-            <a:lstStyle>
-              <a:lvl1pPr algn="l" defTabSz="914400" rtl="0" eaLnBrk="1" latinLnBrk="0" hangingPunct="1">
-                <a:lnSpc>
-                  <a:spcPct val="90000"/>
-                </a:lnSpc>
-                <a:spcBef>
-                  <a:spcPct val="0"/>
-                </a:spcBef>
-                <a:buNone/>
-                <a:defRPr sz="4400" kern="1200">
-                  <a:solidFill>
-                    <a:schemeClr val="tx1"/>
-                  </a:solidFill>
-                  <a:latin typeface="+mj-lt"/>
-                  <a:ea typeface="+mj-ea"/>
-                  <a:cs typeface="+mj-cs"/>
-                </a:defRPr>
-              </a:lvl1pPr>
-            </a:lstStyle>
-            <a:p>
-              <a:pPr>
-                <a:spcBef>
-                  <a:spcPts val="2400"/>
-                </a:spcBef>
-                <a:spcAft>
-                  <a:spcPts val="2400"/>
-                </a:spcAft>
-              </a:pPr>
-              <a:r>
-                <a:rPr lang="en-GB" sz="1600" dirty="0">
-                  <a:solidFill>
-                    <a:srgbClr val="FFFFF0"/>
-                  </a:solidFill>
-                  <a:latin typeface="Avenir Book" panose="02000503020000020003" pitchFamily="2" charset="0"/>
-                </a:rPr>
-                <a:t>#OHBM2020 #OSR</a:t>
-              </a:r>
-              <a:endParaRPr lang="en-US" sz="1600" dirty="0">
-                <a:solidFill>
-                  <a:srgbClr val="FFFFF0"/>
-                </a:solidFill>
-                <a:latin typeface="Avenir Book" panose="02000503020000020003" pitchFamily="2" charset="0"/>
-              </a:endParaRPr>
-            </a:p>
-          </p:txBody>
-        </p:sp>
-      </p:grpSp>
-      <p:grpSp>
-        <p:nvGrpSpPr>
-          <p:cNvPr id="52" name="Group 51">
-            <a:extLst>
-              <a:ext uri="{FF2B5EF4-FFF2-40B4-BE49-F238E27FC236}">
-                <a16:creationId xmlns:a16="http://schemas.microsoft.com/office/drawing/2014/main" id="{04F23E78-B96C-7D4F-B983-4FDEB598874B}"/>
-              </a:ext>
-            </a:extLst>
-          </p:cNvPr>
-          <p:cNvGrpSpPr/>
-          <p:nvPr/>
-        </p:nvGrpSpPr>
-        <p:grpSpPr>
-          <a:xfrm>
-            <a:off x="7388417" y="4719765"/>
-            <a:ext cx="2849942" cy="399371"/>
-            <a:chOff x="7388417" y="4719765"/>
-            <a:chExt cx="2849942" cy="399371"/>
-          </a:xfrm>
-        </p:grpSpPr>
-        <p:pic>
-          <p:nvPicPr>
-            <p:cNvPr id="53" name="Picture 52">
-              <a:extLst>
-                <a:ext uri="{FF2B5EF4-FFF2-40B4-BE49-F238E27FC236}">
-                  <a16:creationId xmlns:a16="http://schemas.microsoft.com/office/drawing/2014/main" id="{7DC1E684-0912-6D40-AC59-15C0CA9A2543}"/>
-                </a:ext>
-              </a:extLst>
-            </p:cNvPr>
-            <p:cNvPicPr>
-              <a:picLocks noChangeAspect="1"/>
-            </p:cNvPicPr>
-            <p:nvPr/>
-          </p:nvPicPr>
-          <p:blipFill>
-            <a:blip r:embed="rId11"/>
-            <a:stretch>
-              <a:fillRect/>
-            </a:stretch>
-          </p:blipFill>
-          <p:spPr>
-            <a:xfrm>
-              <a:off x="7388417" y="4719765"/>
-              <a:ext cx="397612" cy="399371"/>
-            </a:xfrm>
-            <a:prstGeom prst="rect">
-              <a:avLst/>
-            </a:prstGeom>
-          </p:spPr>
-        </p:pic>
-        <p:sp>
-          <p:nvSpPr>
-            <p:cNvPr id="54" name="Title 4">
-              <a:extLst>
-                <a:ext uri="{FF2B5EF4-FFF2-40B4-BE49-F238E27FC236}">
-                  <a16:creationId xmlns:a16="http://schemas.microsoft.com/office/drawing/2014/main" id="{7F92BAA8-6CCF-1345-80D0-3D2A2A90AB68}"/>
-                </a:ext>
-              </a:extLst>
-            </p:cNvPr>
-            <p:cNvSpPr txBox="1">
-              <a:spLocks/>
-            </p:cNvSpPr>
-            <p:nvPr/>
-          </p:nvSpPr>
-          <p:spPr>
-            <a:xfrm>
-              <a:off x="7795494" y="4760112"/>
-              <a:ext cx="2442865" cy="318676"/>
-            </a:xfrm>
-            <a:prstGeom prst="rect">
-              <a:avLst/>
-            </a:prstGeom>
-          </p:spPr>
-          <p:txBody>
-            <a:bodyPr vert="horz" lIns="91440" tIns="45720" rIns="91440" bIns="45720" rtlCol="0" anchor="ctr">
-              <a:noAutofit/>
-            </a:bodyPr>
-            <a:lstStyle>
-              <a:lvl1pPr algn="l" defTabSz="914400" rtl="0" eaLnBrk="1" latinLnBrk="0" hangingPunct="1">
-                <a:lnSpc>
-                  <a:spcPct val="90000"/>
-                </a:lnSpc>
-                <a:spcBef>
-                  <a:spcPct val="0"/>
-                </a:spcBef>
-                <a:buNone/>
-                <a:defRPr sz="4400" kern="1200">
-                  <a:solidFill>
-                    <a:schemeClr val="tx1"/>
-                  </a:solidFill>
-                  <a:latin typeface="+mj-lt"/>
-                  <a:ea typeface="+mj-ea"/>
-                  <a:cs typeface="+mj-cs"/>
-                </a:defRPr>
-              </a:lvl1pPr>
-            </a:lstStyle>
-            <a:p>
-              <a:pPr>
-                <a:spcBef>
-                  <a:spcPts val="2400"/>
-                </a:spcBef>
-                <a:spcAft>
-                  <a:spcPts val="2400"/>
-                </a:spcAft>
-              </a:pPr>
-              <a:r>
-                <a:rPr lang="en-GB" sz="1600" dirty="0" err="1">
-                  <a:solidFill>
-                    <a:srgbClr val="FFFFF0"/>
-                  </a:solidFill>
-                  <a:latin typeface="Avenir Book" panose="02000503020000020003" pitchFamily="2" charset="0"/>
-                </a:rPr>
-                <a:t>hbm</a:t>
-              </a:r>
-              <a:r>
-                <a:rPr lang="en-GB" sz="1600" dirty="0">
-                  <a:solidFill>
-                    <a:srgbClr val="FFFFF0"/>
-                  </a:solidFill>
-                  <a:latin typeface="Avenir Book" panose="02000503020000020003" pitchFamily="2" charset="0"/>
-                </a:rPr>
-                <a:t>-open-science-room</a:t>
-              </a:r>
-              <a:endParaRPr lang="en-US" sz="1600" dirty="0">
-                <a:solidFill>
-                  <a:srgbClr val="FFFFF0"/>
-                </a:solidFill>
-                <a:latin typeface="Avenir Book" panose="02000503020000020003" pitchFamily="2" charset="0"/>
-              </a:endParaRPr>
-            </a:p>
-          </p:txBody>
-        </p:sp>
-      </p:grpSp>
-      <p:grpSp>
-        <p:nvGrpSpPr>
-          <p:cNvPr id="55" name="Group 54">
-            <a:extLst>
-              <a:ext uri="{FF2B5EF4-FFF2-40B4-BE49-F238E27FC236}">
-                <a16:creationId xmlns:a16="http://schemas.microsoft.com/office/drawing/2014/main" id="{9943933B-DA12-654A-AE7E-4DE91295E38F}"/>
-              </a:ext>
-            </a:extLst>
-          </p:cNvPr>
-          <p:cNvGrpSpPr/>
-          <p:nvPr/>
-        </p:nvGrpSpPr>
-        <p:grpSpPr>
-          <a:xfrm>
-            <a:off x="10267830" y="4719765"/>
-            <a:ext cx="2260003" cy="399371"/>
-            <a:chOff x="10267830" y="4719765"/>
-            <a:chExt cx="2260003" cy="399371"/>
-          </a:xfrm>
-        </p:grpSpPr>
-        <p:sp>
-          <p:nvSpPr>
-            <p:cNvPr id="56" name="Title 4">
-              <a:extLst>
-                <a:ext uri="{FF2B5EF4-FFF2-40B4-BE49-F238E27FC236}">
-                  <a16:creationId xmlns:a16="http://schemas.microsoft.com/office/drawing/2014/main" id="{F27FB178-D30F-E74D-A7DE-C0198DC6C576}"/>
-                </a:ext>
-              </a:extLst>
-            </p:cNvPr>
-            <p:cNvSpPr txBox="1">
-              <a:spLocks/>
-            </p:cNvSpPr>
-            <p:nvPr/>
-          </p:nvSpPr>
-          <p:spPr>
-            <a:xfrm>
-              <a:off x="10694913" y="4760112"/>
-              <a:ext cx="1832920" cy="318676"/>
-            </a:xfrm>
-            <a:prstGeom prst="rect">
-              <a:avLst/>
-            </a:prstGeom>
-          </p:spPr>
-          <p:txBody>
-            <a:bodyPr vert="horz" lIns="91440" tIns="45720" rIns="91440" bIns="45720" rtlCol="0" anchor="ctr">
-              <a:noAutofit/>
-            </a:bodyPr>
-            <a:lstStyle>
-              <a:lvl1pPr algn="l" defTabSz="914400" rtl="0" eaLnBrk="1" latinLnBrk="0" hangingPunct="1">
-                <a:lnSpc>
-                  <a:spcPct val="90000"/>
-                </a:lnSpc>
-                <a:spcBef>
-                  <a:spcPct val="0"/>
-                </a:spcBef>
-                <a:buNone/>
-                <a:defRPr sz="4400" kern="1200">
-                  <a:solidFill>
-                    <a:schemeClr val="tx1"/>
-                  </a:solidFill>
-                  <a:latin typeface="+mj-lt"/>
-                  <a:ea typeface="+mj-ea"/>
-                  <a:cs typeface="+mj-cs"/>
-                </a:defRPr>
-              </a:lvl1pPr>
-            </a:lstStyle>
-            <a:p>
-              <a:pPr>
-                <a:spcBef>
-                  <a:spcPts val="2400"/>
-                </a:spcBef>
-                <a:spcAft>
-                  <a:spcPts val="2400"/>
-                </a:spcAft>
-              </a:pPr>
-              <a:r>
-                <a:rPr lang="en-GB" sz="1600" dirty="0" err="1">
-                  <a:solidFill>
-                    <a:srgbClr val="FFFFF0"/>
-                  </a:solidFill>
-                  <a:latin typeface="Avenir Book" panose="02000503020000020003" pitchFamily="2" charset="0"/>
-                </a:rPr>
-                <a:t>osr</a:t>
-              </a:r>
-              <a:r>
-                <a:rPr lang="en-GB" sz="1600" dirty="0">
-                  <a:solidFill>
-                    <a:srgbClr val="FFFFF0"/>
-                  </a:solidFill>
-                  <a:latin typeface="Avenir Book" panose="02000503020000020003" pitchFamily="2" charset="0"/>
-                </a:rPr>
-                <a:t>-future</a:t>
-              </a:r>
-              <a:endParaRPr lang="en-US" sz="1600" dirty="0">
-                <a:solidFill>
-                  <a:srgbClr val="FFFFF0"/>
-                </a:solidFill>
-                <a:latin typeface="Avenir Book" panose="02000503020000020003" pitchFamily="2" charset="0"/>
-              </a:endParaRPr>
-            </a:p>
-          </p:txBody>
-        </p:sp>
-        <p:pic>
-          <p:nvPicPr>
-            <p:cNvPr id="57" name="Picture 56">
-              <a:extLst>
-                <a:ext uri="{FF2B5EF4-FFF2-40B4-BE49-F238E27FC236}">
-                  <a16:creationId xmlns:a16="http://schemas.microsoft.com/office/drawing/2014/main" id="{DF93490A-14FD-A047-9581-7FC9B75F250C}"/>
-                </a:ext>
-              </a:extLst>
-            </p:cNvPr>
-            <p:cNvPicPr>
-              <a:picLocks noChangeAspect="1"/>
-            </p:cNvPicPr>
-            <p:nvPr/>
-          </p:nvPicPr>
-          <p:blipFill>
-            <a:blip r:embed="rId11"/>
-            <a:stretch>
-              <a:fillRect/>
-            </a:stretch>
-          </p:blipFill>
-          <p:spPr>
-            <a:xfrm>
-              <a:off x="10267830" y="4719765"/>
-              <a:ext cx="397612" cy="399371"/>
-            </a:xfrm>
-            <a:prstGeom prst="rect">
-              <a:avLst/>
-            </a:prstGeom>
-          </p:spPr>
-        </p:pic>
-      </p:grpSp>
-      <p:grpSp>
-        <p:nvGrpSpPr>
-          <p:cNvPr id="58" name="Group 57">
-            <a:extLst>
-              <a:ext uri="{FF2B5EF4-FFF2-40B4-BE49-F238E27FC236}">
-                <a16:creationId xmlns:a16="http://schemas.microsoft.com/office/drawing/2014/main" id="{85B1A910-4943-2E40-B8BF-106D9C6F8B9C}"/>
-              </a:ext>
-            </a:extLst>
-          </p:cNvPr>
-          <p:cNvGrpSpPr/>
-          <p:nvPr/>
-        </p:nvGrpSpPr>
-        <p:grpSpPr>
-          <a:xfrm>
-            <a:off x="120508" y="4726041"/>
-            <a:ext cx="2864747" cy="429351"/>
-            <a:chOff x="46077" y="4704775"/>
-            <a:chExt cx="2864747" cy="429351"/>
-          </a:xfrm>
-        </p:grpSpPr>
-        <p:pic>
-          <p:nvPicPr>
-            <p:cNvPr id="59" name="Picture 58">
-              <a:extLst>
-                <a:ext uri="{FF2B5EF4-FFF2-40B4-BE49-F238E27FC236}">
-                  <a16:creationId xmlns:a16="http://schemas.microsoft.com/office/drawing/2014/main" id="{C456C7D2-B448-B64C-8D02-09A6C8A2D295}"/>
-                </a:ext>
-              </a:extLst>
-            </p:cNvPr>
-            <p:cNvPicPr>
-              <a:picLocks noChangeAspect="1"/>
-            </p:cNvPicPr>
-            <p:nvPr/>
-          </p:nvPicPr>
-          <p:blipFill>
-            <a:blip r:embed="rId12"/>
-            <a:stretch>
-              <a:fillRect/>
-            </a:stretch>
-          </p:blipFill>
-          <p:spPr>
-            <a:xfrm>
-              <a:off x="46077" y="4730571"/>
-              <a:ext cx="377759" cy="377759"/>
-            </a:xfrm>
-            <a:prstGeom prst="rect">
-              <a:avLst/>
-            </a:prstGeom>
-          </p:spPr>
-        </p:pic>
-        <p:sp>
-          <p:nvSpPr>
-            <p:cNvPr id="60" name="Title 4">
-              <a:extLst>
-                <a:ext uri="{FF2B5EF4-FFF2-40B4-BE49-F238E27FC236}">
-                  <a16:creationId xmlns:a16="http://schemas.microsoft.com/office/drawing/2014/main" id="{89EDA0E7-2486-584C-A8CD-8396DECD6B49}"/>
-                </a:ext>
-              </a:extLst>
-            </p:cNvPr>
-            <p:cNvSpPr txBox="1">
-              <a:spLocks/>
-            </p:cNvSpPr>
-            <p:nvPr/>
-          </p:nvSpPr>
-          <p:spPr>
-            <a:xfrm>
-              <a:off x="443201" y="4704775"/>
-              <a:ext cx="2467623" cy="429351"/>
-            </a:xfrm>
-            <a:prstGeom prst="rect">
-              <a:avLst/>
-            </a:prstGeom>
-          </p:spPr>
-          <p:txBody>
-            <a:bodyPr vert="horz" lIns="91440" tIns="45720" rIns="91440" bIns="45720" rtlCol="0" anchor="ctr">
-              <a:noAutofit/>
-            </a:bodyPr>
-            <a:lstStyle>
-              <a:lvl1pPr algn="l" defTabSz="914400" rtl="0" eaLnBrk="1" latinLnBrk="0" hangingPunct="1">
-                <a:lnSpc>
-                  <a:spcPct val="90000"/>
-                </a:lnSpc>
-                <a:spcBef>
-                  <a:spcPct val="0"/>
-                </a:spcBef>
-                <a:buNone/>
-                <a:defRPr sz="4400" kern="1200">
-                  <a:solidFill>
-                    <a:schemeClr val="tx1"/>
-                  </a:solidFill>
-                  <a:latin typeface="+mj-lt"/>
-                  <a:ea typeface="+mj-ea"/>
-                  <a:cs typeface="+mj-cs"/>
-                </a:defRPr>
-              </a:lvl1pPr>
-            </a:lstStyle>
-            <a:p>
-              <a:pPr>
-                <a:spcBef>
-                  <a:spcPts val="2400"/>
-                </a:spcBef>
-                <a:spcAft>
-                  <a:spcPts val="2400"/>
-                </a:spcAft>
-              </a:pPr>
-              <a:r>
-                <a:rPr lang="en-GB" sz="1600" dirty="0" err="1">
-                  <a:solidFill>
-                    <a:srgbClr val="FFFFF0"/>
-                  </a:solidFill>
-                  <a:latin typeface="Avenir Book" panose="02000503020000020003" pitchFamily="2" charset="0"/>
-                </a:rPr>
-                <a:t>ohbm.github.io</a:t>
-              </a:r>
-              <a:r>
-                <a:rPr lang="en-GB" sz="1600" dirty="0">
-                  <a:solidFill>
-                    <a:srgbClr val="FFFFF0"/>
-                  </a:solidFill>
-                  <a:latin typeface="Avenir Book" panose="02000503020000020003" pitchFamily="2" charset="0"/>
-                </a:rPr>
-                <a:t>/osr2020</a:t>
-              </a:r>
-              <a:endParaRPr lang="en-US" sz="1600" dirty="0">
-                <a:solidFill>
-                  <a:srgbClr val="FFFFF0"/>
-                </a:solidFill>
-                <a:latin typeface="Avenir Book" panose="02000503020000020003" pitchFamily="2" charset="0"/>
-              </a:endParaRPr>
-            </a:p>
-          </p:txBody>
-        </p:sp>
-      </p:grpSp>
-    </p:spTree>
-    <p:extLst>
-      <p:ext uri="{BB962C8B-B14F-4D97-AF65-F5344CB8AC3E}">
-        <p14:creationId xmlns:p14="http://schemas.microsoft.com/office/powerpoint/2010/main" val="2022647738"/>
-      </p:ext>
-    </p:extLst>
-  </p:cSld>
-  <p:clrMapOvr>
-    <a:masterClrMapping/>
-  </p:clrMapOvr>
-</p:sld>
-</file>
-
 <file path=ppt/slides/slide5.xml><?xml version="1.0" encoding="utf-8"?>
 <p:sld xmlns:a="http://schemas.openxmlformats.org/drawingml/2006/main" xmlns:r="http://schemas.openxmlformats.org/officeDocument/2006/relationships" xmlns:p="http://schemas.openxmlformats.org/presentationml/2006/main">
   <p:cSld>
@@ -46776,7 +46816,7 @@
         </p:nvSpPr>
         <p:spPr>
           <a:xfrm>
-            <a:off x="1119196" y="2322101"/>
+            <a:off x="720000" y="2322101"/>
             <a:ext cx="7245997" cy="3518522"/>
           </a:xfrm>
         </p:spPr>
@@ -47055,7 +47095,7 @@
         </p:nvSpPr>
         <p:spPr>
           <a:xfrm>
-            <a:off x="8365194" y="2322101"/>
+            <a:off x="8006400" y="2322101"/>
             <a:ext cx="3054172" cy="3518522"/>
           </a:xfrm>
           <a:prstGeom prst="rect">
@@ -48107,6 +48147,1150 @@
 </file>
 
 <file path=ppt/slides/slide50.xml><?xml version="1.0" encoding="utf-8"?>
+<p:sld xmlns:a="http://schemas.openxmlformats.org/drawingml/2006/main" xmlns:r="http://schemas.openxmlformats.org/officeDocument/2006/relationships" xmlns:p="http://schemas.openxmlformats.org/presentationml/2006/main">
+  <p:cSld>
+    <p:spTree>
+      <p:nvGrpSpPr>
+        <p:cNvPr id="1" name=""/>
+        <p:cNvGrpSpPr/>
+        <p:nvPr/>
+      </p:nvGrpSpPr>
+      <p:grpSpPr>
+        <a:xfrm>
+          <a:off x="0" y="0"/>
+          <a:ext cx="0" cy="0"/>
+          <a:chOff x="0" y="0"/>
+          <a:chExt cx="0" cy="0"/>
+        </a:xfrm>
+      </p:grpSpPr>
+      <p:sp>
+        <p:nvSpPr>
+          <p:cNvPr id="11" name="Rectangle 10">
+            <a:extLst>
+              <a:ext uri="{FF2B5EF4-FFF2-40B4-BE49-F238E27FC236}">
+                <a16:creationId xmlns:a16="http://schemas.microsoft.com/office/drawing/2014/main" id="{370F5D13-40E0-3E47-83EC-F117AB5C8BFC}"/>
+              </a:ext>
+            </a:extLst>
+          </p:cNvPr>
+          <p:cNvSpPr/>
+          <p:nvPr/>
+        </p:nvSpPr>
+        <p:spPr>
+          <a:xfrm>
+            <a:off x="-10633" y="-10633"/>
+            <a:ext cx="12213266" cy="5448397"/>
+          </a:xfrm>
+          <a:prstGeom prst="rect">
+            <a:avLst/>
+          </a:prstGeom>
+          <a:solidFill>
+            <a:srgbClr val="004E63"/>
+          </a:solidFill>
+          <a:ln>
+            <a:noFill/>
+          </a:ln>
+        </p:spPr>
+        <p:style>
+          <a:lnRef idx="2">
+            <a:schemeClr val="accent1">
+              <a:shade val="50000"/>
+            </a:schemeClr>
+          </a:lnRef>
+          <a:fillRef idx="1">
+            <a:schemeClr val="accent1"/>
+          </a:fillRef>
+          <a:effectRef idx="0">
+            <a:schemeClr val="accent1"/>
+          </a:effectRef>
+          <a:fontRef idx="minor">
+            <a:schemeClr val="lt1"/>
+          </a:fontRef>
+        </p:style>
+        <p:txBody>
+          <a:bodyPr rot="0" spcFirstLastPara="0" vertOverflow="overflow" horzOverflow="overflow" vert="horz" wrap="square" lIns="91440" tIns="45720" rIns="91440" bIns="45720" numCol="1" spcCol="0" rtlCol="0" fromWordArt="0" anchor="ctr" anchorCtr="0" forceAA="0" compatLnSpc="1">
+            <a:prstTxWarp prst="textNoShape">
+              <a:avLst/>
+            </a:prstTxWarp>
+            <a:noAutofit/>
+          </a:bodyPr>
+          <a:lstStyle/>
+          <a:p>
+            <a:pPr algn="ctr"/>
+            <a:endParaRPr lang="en-US" dirty="0">
+              <a:highlight>
+                <a:srgbClr val="004E63"/>
+              </a:highlight>
+            </a:endParaRPr>
+          </a:p>
+        </p:txBody>
+      </p:sp>
+      <p:grpSp>
+        <p:nvGrpSpPr>
+          <p:cNvPr id="27" name="Group 26">
+            <a:extLst>
+              <a:ext uri="{FF2B5EF4-FFF2-40B4-BE49-F238E27FC236}">
+                <a16:creationId xmlns:a16="http://schemas.microsoft.com/office/drawing/2014/main" id="{EA249572-7EE9-E340-AE36-2BE393DF181D}"/>
+              </a:ext>
+            </a:extLst>
+          </p:cNvPr>
+          <p:cNvGrpSpPr/>
+          <p:nvPr/>
+        </p:nvGrpSpPr>
+        <p:grpSpPr>
+          <a:xfrm>
+            <a:off x="204923" y="5265127"/>
+            <a:ext cx="11782153" cy="1497533"/>
+            <a:chOff x="87743" y="-173110"/>
+            <a:chExt cx="11782153" cy="1497533"/>
+          </a:xfrm>
+        </p:grpSpPr>
+        <p:pic>
+          <p:nvPicPr>
+            <p:cNvPr id="4" name="Picture 3">
+              <a:extLst>
+                <a:ext uri="{FF2B5EF4-FFF2-40B4-BE49-F238E27FC236}">
+                  <a16:creationId xmlns:a16="http://schemas.microsoft.com/office/drawing/2014/main" id="{193B5A88-2D72-5D4A-B4ED-9B4519FECFA6}"/>
+                </a:ext>
+              </a:extLst>
+            </p:cNvPr>
+            <p:cNvPicPr>
+              <a:picLocks noChangeAspect="1"/>
+            </p:cNvPicPr>
+            <p:nvPr/>
+          </p:nvPicPr>
+          <p:blipFill>
+            <a:blip r:embed="rId3"/>
+            <a:stretch>
+              <a:fillRect/>
+            </a:stretch>
+          </p:blipFill>
+          <p:spPr>
+            <a:xfrm>
+              <a:off x="8724823" y="870532"/>
+              <a:ext cx="3145073" cy="453891"/>
+            </a:xfrm>
+            <a:prstGeom prst="rect">
+              <a:avLst/>
+            </a:prstGeom>
+          </p:spPr>
+        </p:pic>
+        <p:pic>
+          <p:nvPicPr>
+            <p:cNvPr id="6" name="Picture 5">
+              <a:extLst>
+                <a:ext uri="{FF2B5EF4-FFF2-40B4-BE49-F238E27FC236}">
+                  <a16:creationId xmlns:a16="http://schemas.microsoft.com/office/drawing/2014/main" id="{556E9061-DE60-1443-B08E-F1771F7A456A}"/>
+                </a:ext>
+              </a:extLst>
+            </p:cNvPr>
+            <p:cNvPicPr>
+              <a:picLocks noChangeAspect="1"/>
+            </p:cNvPicPr>
+            <p:nvPr/>
+          </p:nvPicPr>
+          <p:blipFill>
+            <a:blip r:embed="rId4"/>
+            <a:stretch>
+              <a:fillRect/>
+            </a:stretch>
+          </p:blipFill>
+          <p:spPr>
+            <a:xfrm>
+              <a:off x="6539652" y="473094"/>
+              <a:ext cx="1452303" cy="812713"/>
+            </a:xfrm>
+            <a:prstGeom prst="rect">
+              <a:avLst/>
+            </a:prstGeom>
+          </p:spPr>
+        </p:pic>
+        <p:pic>
+          <p:nvPicPr>
+            <p:cNvPr id="10" name="Picture 9">
+              <a:extLst>
+                <a:ext uri="{FF2B5EF4-FFF2-40B4-BE49-F238E27FC236}">
+                  <a16:creationId xmlns:a16="http://schemas.microsoft.com/office/drawing/2014/main" id="{65C6A7F9-843E-EE48-A7F4-3451C9B81CA5}"/>
+                </a:ext>
+              </a:extLst>
+            </p:cNvPr>
+            <p:cNvPicPr>
+              <a:picLocks noChangeAspect="1"/>
+            </p:cNvPicPr>
+            <p:nvPr/>
+          </p:nvPicPr>
+          <p:blipFill>
+            <a:blip r:embed="rId5"/>
+            <a:stretch>
+              <a:fillRect/>
+            </a:stretch>
+          </p:blipFill>
+          <p:spPr>
+            <a:xfrm>
+              <a:off x="8121685" y="-173110"/>
+              <a:ext cx="3145073" cy="1155197"/>
+            </a:xfrm>
+            <a:prstGeom prst="rect">
+              <a:avLst/>
+            </a:prstGeom>
+          </p:spPr>
+        </p:pic>
+        <p:pic>
+          <p:nvPicPr>
+            <p:cNvPr id="14" name="Picture 13">
+              <a:extLst>
+                <a:ext uri="{FF2B5EF4-FFF2-40B4-BE49-F238E27FC236}">
+                  <a16:creationId xmlns:a16="http://schemas.microsoft.com/office/drawing/2014/main" id="{09D3B546-A78F-564E-81E4-E18D87AD67BB}"/>
+                </a:ext>
+              </a:extLst>
+            </p:cNvPr>
+            <p:cNvPicPr>
+              <a:picLocks noChangeAspect="1"/>
+            </p:cNvPicPr>
+            <p:nvPr/>
+          </p:nvPicPr>
+          <p:blipFill>
+            <a:blip r:embed="rId6"/>
+            <a:stretch>
+              <a:fillRect/>
+            </a:stretch>
+          </p:blipFill>
+          <p:spPr>
+            <a:xfrm>
+              <a:off x="3918931" y="269232"/>
+              <a:ext cx="2427006" cy="766423"/>
+            </a:xfrm>
+            <a:prstGeom prst="rect">
+              <a:avLst/>
+            </a:prstGeom>
+          </p:spPr>
+        </p:pic>
+        <p:pic>
+          <p:nvPicPr>
+            <p:cNvPr id="23" name="Picture 22">
+              <a:extLst>
+                <a:ext uri="{FF2B5EF4-FFF2-40B4-BE49-F238E27FC236}">
+                  <a16:creationId xmlns:a16="http://schemas.microsoft.com/office/drawing/2014/main" id="{71D7F83A-8338-0445-B8DF-3D9EC7A7C1FF}"/>
+                </a:ext>
+              </a:extLst>
+            </p:cNvPr>
+            <p:cNvPicPr>
+              <a:picLocks noChangeAspect="1"/>
+            </p:cNvPicPr>
+            <p:nvPr/>
+          </p:nvPicPr>
+          <p:blipFill>
+            <a:blip r:embed="rId7"/>
+            <a:stretch>
+              <a:fillRect/>
+            </a:stretch>
+          </p:blipFill>
+          <p:spPr>
+            <a:xfrm>
+              <a:off x="87743" y="146216"/>
+              <a:ext cx="1452302" cy="1118350"/>
+            </a:xfrm>
+            <a:prstGeom prst="rect">
+              <a:avLst/>
+            </a:prstGeom>
+          </p:spPr>
+        </p:pic>
+        <p:pic>
+          <p:nvPicPr>
+            <p:cNvPr id="19" name="Picture 18">
+              <a:extLst>
+                <a:ext uri="{FF2B5EF4-FFF2-40B4-BE49-F238E27FC236}">
+                  <a16:creationId xmlns:a16="http://schemas.microsoft.com/office/drawing/2014/main" id="{3610D2C6-15F2-3B4A-8313-010132646781}"/>
+                </a:ext>
+              </a:extLst>
+            </p:cNvPr>
+            <p:cNvPicPr>
+              <a:picLocks noChangeAspect="1"/>
+            </p:cNvPicPr>
+            <p:nvPr/>
+          </p:nvPicPr>
+          <p:blipFill>
+            <a:blip r:embed="rId8"/>
+            <a:stretch>
+              <a:fillRect/>
+            </a:stretch>
+          </p:blipFill>
+          <p:spPr>
+            <a:xfrm>
+              <a:off x="1448605" y="366406"/>
+              <a:ext cx="2298618" cy="751471"/>
+            </a:xfrm>
+            <a:prstGeom prst="rect">
+              <a:avLst/>
+            </a:prstGeom>
+          </p:spPr>
+        </p:pic>
+      </p:grpSp>
+      <p:pic>
+        <p:nvPicPr>
+          <p:cNvPr id="40" name="Picture 39">
+            <a:extLst>
+              <a:ext uri="{FF2B5EF4-FFF2-40B4-BE49-F238E27FC236}">
+                <a16:creationId xmlns:a16="http://schemas.microsoft.com/office/drawing/2014/main" id="{6936BE48-C50B-B64F-8D8F-FB595F5E7CD1}"/>
+              </a:ext>
+            </a:extLst>
+          </p:cNvPr>
+          <p:cNvPicPr>
+            <a:picLocks noChangeAspect="1"/>
+          </p:cNvPicPr>
+          <p:nvPr/>
+        </p:nvPicPr>
+        <p:blipFill rotWithShape="1">
+          <a:blip r:embed="rId9"/>
+          <a:srcRect b="8869"/>
+          <a:stretch/>
+        </p:blipFill>
+        <p:spPr>
+          <a:xfrm>
+            <a:off x="8210819" y="90659"/>
+            <a:ext cx="3877941" cy="1605988"/>
+          </a:xfrm>
+          <a:prstGeom prst="rect">
+            <a:avLst/>
+          </a:prstGeom>
+        </p:spPr>
+      </p:pic>
+      <p:sp>
+        <p:nvSpPr>
+          <p:cNvPr id="30" name="Title 4">
+            <a:extLst>
+              <a:ext uri="{FF2B5EF4-FFF2-40B4-BE49-F238E27FC236}">
+                <a16:creationId xmlns:a16="http://schemas.microsoft.com/office/drawing/2014/main" id="{B680D021-4789-6447-BE2C-0CB0936738DD}"/>
+              </a:ext>
+            </a:extLst>
+          </p:cNvPr>
+          <p:cNvSpPr>
+            <a:spLocks noGrp="1"/>
+          </p:cNvSpPr>
+          <p:nvPr>
+            <p:ph type="title"/>
+          </p:nvPr>
+        </p:nvSpPr>
+        <p:spPr>
+          <a:xfrm>
+            <a:off x="820376" y="1903271"/>
+            <a:ext cx="11166699" cy="1065270"/>
+          </a:xfrm>
+        </p:spPr>
+        <p:txBody>
+          <a:bodyPr anchor="b">
+            <a:noAutofit/>
+          </a:bodyPr>
+          <a:lstStyle/>
+          <a:p>
+            <a:pPr>
+              <a:spcBef>
+                <a:spcPts val="2400"/>
+              </a:spcBef>
+              <a:spcAft>
+                <a:spcPts val="2400"/>
+              </a:spcAft>
+            </a:pPr>
+            <a:r>
+              <a:rPr lang="en-GB" b="1" dirty="0">
+                <a:solidFill>
+                  <a:srgbClr val="FFFFF0"/>
+                </a:solidFill>
+                <a:latin typeface="Avenir Book" panose="02000503020000020003" pitchFamily="2" charset="0"/>
+              </a:rPr>
+              <a:t>Past, Present and Future of Neuroimaging: Demonstrations</a:t>
+            </a:r>
+            <a:endParaRPr lang="en-US" b="1" dirty="0">
+              <a:solidFill>
+                <a:srgbClr val="FFFFF0"/>
+              </a:solidFill>
+              <a:latin typeface="Avenir Book" panose="02000503020000020003" pitchFamily="2" charset="0"/>
+            </a:endParaRPr>
+          </a:p>
+        </p:txBody>
+      </p:sp>
+      <p:cxnSp>
+        <p:nvCxnSpPr>
+          <p:cNvPr id="31" name="Straight Connector 30">
+            <a:extLst>
+              <a:ext uri="{FF2B5EF4-FFF2-40B4-BE49-F238E27FC236}">
+                <a16:creationId xmlns:a16="http://schemas.microsoft.com/office/drawing/2014/main" id="{69311614-B7AF-2F4B-B24D-56234D21D363}"/>
+              </a:ext>
+            </a:extLst>
+          </p:cNvPr>
+          <p:cNvCxnSpPr>
+            <a:cxnSpLocks/>
+          </p:cNvCxnSpPr>
+          <p:nvPr/>
+        </p:nvCxnSpPr>
+        <p:spPr>
+          <a:xfrm>
+            <a:off x="550927" y="1462768"/>
+            <a:ext cx="0" cy="2230043"/>
+          </a:xfrm>
+          <a:prstGeom prst="line">
+            <a:avLst/>
+          </a:prstGeom>
+          <a:noFill/>
+          <a:ln w="76200" cap="flat">
+            <a:solidFill>
+              <a:srgbClr val="FFFFF0"/>
+            </a:solidFill>
+            <a:prstDash val="solid"/>
+            <a:miter lim="400000"/>
+          </a:ln>
+          <a:effectLst/>
+          <a:sp3d/>
+        </p:spPr>
+        <p:style>
+          <a:lnRef idx="0">
+            <a:scrgbClr r="0" g="0" b="0"/>
+          </a:lnRef>
+          <a:fillRef idx="0">
+            <a:scrgbClr r="0" g="0" b="0"/>
+          </a:fillRef>
+          <a:effectRef idx="0">
+            <a:scrgbClr r="0" g="0" b="0"/>
+          </a:effectRef>
+          <a:fontRef idx="none"/>
+        </p:style>
+      </p:cxnSp>
+      <p:sp>
+        <p:nvSpPr>
+          <p:cNvPr id="32" name="Title 4">
+            <a:extLst>
+              <a:ext uri="{FF2B5EF4-FFF2-40B4-BE49-F238E27FC236}">
+                <a16:creationId xmlns:a16="http://schemas.microsoft.com/office/drawing/2014/main" id="{5F820F38-0020-A446-A78E-6A1DABABEEB3}"/>
+              </a:ext>
+            </a:extLst>
+          </p:cNvPr>
+          <p:cNvSpPr txBox="1">
+            <a:spLocks/>
+          </p:cNvSpPr>
+          <p:nvPr/>
+        </p:nvSpPr>
+        <p:spPr>
+          <a:xfrm>
+            <a:off x="887828" y="2604832"/>
+            <a:ext cx="8224454" cy="1065270"/>
+          </a:xfrm>
+          <a:prstGeom prst="rect">
+            <a:avLst/>
+          </a:prstGeom>
+        </p:spPr>
+        <p:txBody>
+          <a:bodyPr vert="horz" lIns="91440" tIns="45720" rIns="91440" bIns="45720" rtlCol="0" anchor="b">
+            <a:noAutofit/>
+          </a:bodyPr>
+          <a:lstStyle>
+            <a:lvl1pPr algn="l" defTabSz="914400" rtl="0" eaLnBrk="1" latinLnBrk="0" hangingPunct="1">
+              <a:lnSpc>
+                <a:spcPct val="90000"/>
+              </a:lnSpc>
+              <a:spcBef>
+                <a:spcPct val="0"/>
+              </a:spcBef>
+              <a:buNone/>
+              <a:defRPr sz="4400" kern="1200">
+                <a:solidFill>
+                  <a:schemeClr val="tx1"/>
+                </a:solidFill>
+                <a:latin typeface="+mj-lt"/>
+                <a:ea typeface="+mj-ea"/>
+                <a:cs typeface="+mj-cs"/>
+              </a:defRPr>
+            </a:lvl1pPr>
+          </a:lstStyle>
+          <a:p>
+            <a:pPr>
+              <a:spcBef>
+                <a:spcPts val="2400"/>
+              </a:spcBef>
+              <a:spcAft>
+                <a:spcPts val="2400"/>
+              </a:spcAft>
+            </a:pPr>
+            <a:r>
+              <a:rPr lang="en-GB" sz="3600" b="1" dirty="0">
+                <a:solidFill>
+                  <a:srgbClr val="FFFFF0"/>
+                </a:solidFill>
+                <a:latin typeface="Avenir Book" panose="02000503020000020003" pitchFamily="2" charset="0"/>
+              </a:rPr>
+              <a:t>Starting soon…</a:t>
+            </a:r>
+          </a:p>
+        </p:txBody>
+      </p:sp>
+      <p:grpSp>
+        <p:nvGrpSpPr>
+          <p:cNvPr id="37" name="Group 36">
+            <a:extLst>
+              <a:ext uri="{FF2B5EF4-FFF2-40B4-BE49-F238E27FC236}">
+                <a16:creationId xmlns:a16="http://schemas.microsoft.com/office/drawing/2014/main" id="{6C6A5B1F-817D-0740-934D-E55860F56CFF}"/>
+              </a:ext>
+            </a:extLst>
+          </p:cNvPr>
+          <p:cNvGrpSpPr/>
+          <p:nvPr/>
+        </p:nvGrpSpPr>
+        <p:grpSpPr>
+          <a:xfrm>
+            <a:off x="2955183" y="4704775"/>
+            <a:ext cx="1916953" cy="429351"/>
+            <a:chOff x="2838223" y="4704775"/>
+            <a:chExt cx="1916953" cy="429351"/>
+          </a:xfrm>
+        </p:grpSpPr>
+        <p:pic>
+          <p:nvPicPr>
+            <p:cNvPr id="41" name="Picture 40">
+              <a:extLst>
+                <a:ext uri="{FF2B5EF4-FFF2-40B4-BE49-F238E27FC236}">
+                  <a16:creationId xmlns:a16="http://schemas.microsoft.com/office/drawing/2014/main" id="{3DE3BDF7-3930-B342-9A85-AD87934F6987}"/>
+                </a:ext>
+              </a:extLst>
+            </p:cNvPr>
+            <p:cNvPicPr>
+              <a:picLocks noChangeAspect="1"/>
+            </p:cNvPicPr>
+            <p:nvPr/>
+          </p:nvPicPr>
+          <p:blipFill>
+            <a:blip r:embed="rId10"/>
+            <a:stretch>
+              <a:fillRect/>
+            </a:stretch>
+          </p:blipFill>
+          <p:spPr>
+            <a:xfrm>
+              <a:off x="2838223" y="4719765"/>
+              <a:ext cx="385796" cy="399371"/>
+            </a:xfrm>
+            <a:prstGeom prst="rect">
+              <a:avLst/>
+            </a:prstGeom>
+          </p:spPr>
+        </p:pic>
+        <p:sp>
+          <p:nvSpPr>
+            <p:cNvPr id="48" name="Title 4">
+              <a:extLst>
+                <a:ext uri="{FF2B5EF4-FFF2-40B4-BE49-F238E27FC236}">
+                  <a16:creationId xmlns:a16="http://schemas.microsoft.com/office/drawing/2014/main" id="{EA54FF2B-9779-C94E-8234-2132DDD38B66}"/>
+                </a:ext>
+              </a:extLst>
+            </p:cNvPr>
+            <p:cNvSpPr txBox="1">
+              <a:spLocks/>
+            </p:cNvSpPr>
+            <p:nvPr/>
+          </p:nvSpPr>
+          <p:spPr>
+            <a:xfrm>
+              <a:off x="3236024" y="4704775"/>
+              <a:ext cx="1519152" cy="429351"/>
+            </a:xfrm>
+            <a:prstGeom prst="rect">
+              <a:avLst/>
+            </a:prstGeom>
+          </p:spPr>
+          <p:txBody>
+            <a:bodyPr vert="horz" lIns="91440" tIns="45720" rIns="91440" bIns="45720" rtlCol="0" anchor="ctr">
+              <a:noAutofit/>
+            </a:bodyPr>
+            <a:lstStyle>
+              <a:lvl1pPr algn="l" defTabSz="914400" rtl="0" eaLnBrk="1" latinLnBrk="0" hangingPunct="1">
+                <a:lnSpc>
+                  <a:spcPct val="90000"/>
+                </a:lnSpc>
+                <a:spcBef>
+                  <a:spcPct val="0"/>
+                </a:spcBef>
+                <a:buNone/>
+                <a:defRPr sz="4400" kern="1200">
+                  <a:solidFill>
+                    <a:schemeClr val="tx1"/>
+                  </a:solidFill>
+                  <a:latin typeface="+mj-lt"/>
+                  <a:ea typeface="+mj-ea"/>
+                  <a:cs typeface="+mj-cs"/>
+                </a:defRPr>
+              </a:lvl1pPr>
+            </a:lstStyle>
+            <a:p>
+              <a:pPr>
+                <a:spcBef>
+                  <a:spcPts val="2400"/>
+                </a:spcBef>
+                <a:spcAft>
+                  <a:spcPts val="2400"/>
+                </a:spcAft>
+              </a:pPr>
+              <a:r>
+                <a:rPr lang="en-GB" sz="1600" dirty="0">
+                  <a:solidFill>
+                    <a:srgbClr val="FFFFF0"/>
+                  </a:solidFill>
+                  <a:latin typeface="Avenir Book" panose="02000503020000020003" pitchFamily="2" charset="0"/>
+                </a:rPr>
+                <a:t>@</a:t>
+              </a:r>
+              <a:r>
+                <a:rPr lang="en-GB" sz="1600" dirty="0" err="1">
+                  <a:solidFill>
+                    <a:srgbClr val="FFFFF0"/>
+                  </a:solidFill>
+                  <a:latin typeface="Avenir Book" panose="02000503020000020003" pitchFamily="2" charset="0"/>
+                </a:rPr>
+                <a:t>OHBMOpen</a:t>
+              </a:r>
+              <a:endParaRPr lang="en-US" sz="1600" dirty="0">
+                <a:solidFill>
+                  <a:srgbClr val="FFFFF0"/>
+                </a:solidFill>
+                <a:latin typeface="Avenir Book" panose="02000503020000020003" pitchFamily="2" charset="0"/>
+              </a:endParaRPr>
+            </a:p>
+          </p:txBody>
+        </p:sp>
+      </p:grpSp>
+      <p:grpSp>
+        <p:nvGrpSpPr>
+          <p:cNvPr id="49" name="Group 48">
+            <a:extLst>
+              <a:ext uri="{FF2B5EF4-FFF2-40B4-BE49-F238E27FC236}">
+                <a16:creationId xmlns:a16="http://schemas.microsoft.com/office/drawing/2014/main" id="{0FE406E7-492B-8241-B497-FAD92A2DDDF6}"/>
+              </a:ext>
+            </a:extLst>
+          </p:cNvPr>
+          <p:cNvGrpSpPr/>
+          <p:nvPr/>
+        </p:nvGrpSpPr>
+        <p:grpSpPr>
+          <a:xfrm>
+            <a:off x="4931963" y="4698425"/>
+            <a:ext cx="2426983" cy="442051"/>
+            <a:chOff x="4931963" y="4698425"/>
+            <a:chExt cx="2426983" cy="442051"/>
+          </a:xfrm>
+        </p:grpSpPr>
+        <p:pic>
+          <p:nvPicPr>
+            <p:cNvPr id="50" name="Picture 49">
+              <a:extLst>
+                <a:ext uri="{FF2B5EF4-FFF2-40B4-BE49-F238E27FC236}">
+                  <a16:creationId xmlns:a16="http://schemas.microsoft.com/office/drawing/2014/main" id="{E50FF467-6681-BD45-B3BA-D4BA6FDDA11A}"/>
+                </a:ext>
+              </a:extLst>
+            </p:cNvPr>
+            <p:cNvPicPr>
+              <a:picLocks noChangeAspect="1"/>
+            </p:cNvPicPr>
+            <p:nvPr/>
+          </p:nvPicPr>
+          <p:blipFill>
+            <a:blip r:embed="rId10"/>
+            <a:stretch>
+              <a:fillRect/>
+            </a:stretch>
+          </p:blipFill>
+          <p:spPr>
+            <a:xfrm>
+              <a:off x="4931963" y="4719765"/>
+              <a:ext cx="385796" cy="399371"/>
+            </a:xfrm>
+            <a:prstGeom prst="rect">
+              <a:avLst/>
+            </a:prstGeom>
+          </p:spPr>
+        </p:pic>
+        <p:sp>
+          <p:nvSpPr>
+            <p:cNvPr id="51" name="Title 4">
+              <a:extLst>
+                <a:ext uri="{FF2B5EF4-FFF2-40B4-BE49-F238E27FC236}">
+                  <a16:creationId xmlns:a16="http://schemas.microsoft.com/office/drawing/2014/main" id="{F97B9BDD-34FC-1E4E-A1DF-6BA2B30145F9}"/>
+                </a:ext>
+              </a:extLst>
+            </p:cNvPr>
+            <p:cNvSpPr txBox="1">
+              <a:spLocks/>
+            </p:cNvSpPr>
+            <p:nvPr/>
+          </p:nvSpPr>
+          <p:spPr>
+            <a:xfrm>
+              <a:off x="5342095" y="4698425"/>
+              <a:ext cx="2016851" cy="442051"/>
+            </a:xfrm>
+            <a:prstGeom prst="rect">
+              <a:avLst/>
+            </a:prstGeom>
+          </p:spPr>
+          <p:txBody>
+            <a:bodyPr vert="horz" lIns="91440" tIns="45720" rIns="91440" bIns="45720" rtlCol="0" anchor="ctr">
+              <a:noAutofit/>
+            </a:bodyPr>
+            <a:lstStyle>
+              <a:lvl1pPr algn="l" defTabSz="914400" rtl="0" eaLnBrk="1" latinLnBrk="0" hangingPunct="1">
+                <a:lnSpc>
+                  <a:spcPct val="90000"/>
+                </a:lnSpc>
+                <a:spcBef>
+                  <a:spcPct val="0"/>
+                </a:spcBef>
+                <a:buNone/>
+                <a:defRPr sz="4400" kern="1200">
+                  <a:solidFill>
+                    <a:schemeClr val="tx1"/>
+                  </a:solidFill>
+                  <a:latin typeface="+mj-lt"/>
+                  <a:ea typeface="+mj-ea"/>
+                  <a:cs typeface="+mj-cs"/>
+                </a:defRPr>
+              </a:lvl1pPr>
+            </a:lstStyle>
+            <a:p>
+              <a:pPr>
+                <a:spcBef>
+                  <a:spcPts val="2400"/>
+                </a:spcBef>
+                <a:spcAft>
+                  <a:spcPts val="2400"/>
+                </a:spcAft>
+              </a:pPr>
+              <a:r>
+                <a:rPr lang="en-GB" sz="1600" dirty="0">
+                  <a:solidFill>
+                    <a:srgbClr val="FFFFF0"/>
+                  </a:solidFill>
+                  <a:latin typeface="Avenir Book" panose="02000503020000020003" pitchFamily="2" charset="0"/>
+                </a:rPr>
+                <a:t>#OHBM2020 #OSR</a:t>
+              </a:r>
+              <a:endParaRPr lang="en-US" sz="1600" dirty="0">
+                <a:solidFill>
+                  <a:srgbClr val="FFFFF0"/>
+                </a:solidFill>
+                <a:latin typeface="Avenir Book" panose="02000503020000020003" pitchFamily="2" charset="0"/>
+              </a:endParaRPr>
+            </a:p>
+          </p:txBody>
+        </p:sp>
+      </p:grpSp>
+      <p:grpSp>
+        <p:nvGrpSpPr>
+          <p:cNvPr id="52" name="Group 51">
+            <a:extLst>
+              <a:ext uri="{FF2B5EF4-FFF2-40B4-BE49-F238E27FC236}">
+                <a16:creationId xmlns:a16="http://schemas.microsoft.com/office/drawing/2014/main" id="{04F23E78-B96C-7D4F-B983-4FDEB598874B}"/>
+              </a:ext>
+            </a:extLst>
+          </p:cNvPr>
+          <p:cNvGrpSpPr/>
+          <p:nvPr/>
+        </p:nvGrpSpPr>
+        <p:grpSpPr>
+          <a:xfrm>
+            <a:off x="7388417" y="4719765"/>
+            <a:ext cx="2849942" cy="399371"/>
+            <a:chOff x="7388417" y="4719765"/>
+            <a:chExt cx="2849942" cy="399371"/>
+          </a:xfrm>
+        </p:grpSpPr>
+        <p:pic>
+          <p:nvPicPr>
+            <p:cNvPr id="53" name="Picture 52">
+              <a:extLst>
+                <a:ext uri="{FF2B5EF4-FFF2-40B4-BE49-F238E27FC236}">
+                  <a16:creationId xmlns:a16="http://schemas.microsoft.com/office/drawing/2014/main" id="{7DC1E684-0912-6D40-AC59-15C0CA9A2543}"/>
+                </a:ext>
+              </a:extLst>
+            </p:cNvPr>
+            <p:cNvPicPr>
+              <a:picLocks noChangeAspect="1"/>
+            </p:cNvPicPr>
+            <p:nvPr/>
+          </p:nvPicPr>
+          <p:blipFill>
+            <a:blip r:embed="rId11"/>
+            <a:stretch>
+              <a:fillRect/>
+            </a:stretch>
+          </p:blipFill>
+          <p:spPr>
+            <a:xfrm>
+              <a:off x="7388417" y="4719765"/>
+              <a:ext cx="397612" cy="399371"/>
+            </a:xfrm>
+            <a:prstGeom prst="rect">
+              <a:avLst/>
+            </a:prstGeom>
+          </p:spPr>
+        </p:pic>
+        <p:sp>
+          <p:nvSpPr>
+            <p:cNvPr id="54" name="Title 4">
+              <a:extLst>
+                <a:ext uri="{FF2B5EF4-FFF2-40B4-BE49-F238E27FC236}">
+                  <a16:creationId xmlns:a16="http://schemas.microsoft.com/office/drawing/2014/main" id="{7F92BAA8-6CCF-1345-80D0-3D2A2A90AB68}"/>
+                </a:ext>
+              </a:extLst>
+            </p:cNvPr>
+            <p:cNvSpPr txBox="1">
+              <a:spLocks/>
+            </p:cNvSpPr>
+            <p:nvPr/>
+          </p:nvSpPr>
+          <p:spPr>
+            <a:xfrm>
+              <a:off x="7795494" y="4760112"/>
+              <a:ext cx="2442865" cy="318676"/>
+            </a:xfrm>
+            <a:prstGeom prst="rect">
+              <a:avLst/>
+            </a:prstGeom>
+          </p:spPr>
+          <p:txBody>
+            <a:bodyPr vert="horz" lIns="91440" tIns="45720" rIns="91440" bIns="45720" rtlCol="0" anchor="ctr">
+              <a:noAutofit/>
+            </a:bodyPr>
+            <a:lstStyle>
+              <a:lvl1pPr algn="l" defTabSz="914400" rtl="0" eaLnBrk="1" latinLnBrk="0" hangingPunct="1">
+                <a:lnSpc>
+                  <a:spcPct val="90000"/>
+                </a:lnSpc>
+                <a:spcBef>
+                  <a:spcPct val="0"/>
+                </a:spcBef>
+                <a:buNone/>
+                <a:defRPr sz="4400" kern="1200">
+                  <a:solidFill>
+                    <a:schemeClr val="tx1"/>
+                  </a:solidFill>
+                  <a:latin typeface="+mj-lt"/>
+                  <a:ea typeface="+mj-ea"/>
+                  <a:cs typeface="+mj-cs"/>
+                </a:defRPr>
+              </a:lvl1pPr>
+            </a:lstStyle>
+            <a:p>
+              <a:pPr>
+                <a:spcBef>
+                  <a:spcPts val="2400"/>
+                </a:spcBef>
+                <a:spcAft>
+                  <a:spcPts val="2400"/>
+                </a:spcAft>
+              </a:pPr>
+              <a:r>
+                <a:rPr lang="en-GB" sz="1600" dirty="0" err="1">
+                  <a:solidFill>
+                    <a:srgbClr val="FFFFF0"/>
+                  </a:solidFill>
+                  <a:latin typeface="Avenir Book" panose="02000503020000020003" pitchFamily="2" charset="0"/>
+                </a:rPr>
+                <a:t>hbm</a:t>
+              </a:r>
+              <a:r>
+                <a:rPr lang="en-GB" sz="1600" dirty="0">
+                  <a:solidFill>
+                    <a:srgbClr val="FFFFF0"/>
+                  </a:solidFill>
+                  <a:latin typeface="Avenir Book" panose="02000503020000020003" pitchFamily="2" charset="0"/>
+                </a:rPr>
+                <a:t>-open-science-room</a:t>
+              </a:r>
+              <a:endParaRPr lang="en-US" sz="1600" dirty="0">
+                <a:solidFill>
+                  <a:srgbClr val="FFFFF0"/>
+                </a:solidFill>
+                <a:latin typeface="Avenir Book" panose="02000503020000020003" pitchFamily="2" charset="0"/>
+              </a:endParaRPr>
+            </a:p>
+          </p:txBody>
+        </p:sp>
+      </p:grpSp>
+      <p:grpSp>
+        <p:nvGrpSpPr>
+          <p:cNvPr id="55" name="Group 54">
+            <a:extLst>
+              <a:ext uri="{FF2B5EF4-FFF2-40B4-BE49-F238E27FC236}">
+                <a16:creationId xmlns:a16="http://schemas.microsoft.com/office/drawing/2014/main" id="{9943933B-DA12-654A-AE7E-4DE91295E38F}"/>
+              </a:ext>
+            </a:extLst>
+          </p:cNvPr>
+          <p:cNvGrpSpPr/>
+          <p:nvPr/>
+        </p:nvGrpSpPr>
+        <p:grpSpPr>
+          <a:xfrm>
+            <a:off x="10267830" y="4719765"/>
+            <a:ext cx="2260003" cy="399371"/>
+            <a:chOff x="10267830" y="4719765"/>
+            <a:chExt cx="2260003" cy="399371"/>
+          </a:xfrm>
+        </p:grpSpPr>
+        <p:sp>
+          <p:nvSpPr>
+            <p:cNvPr id="56" name="Title 4">
+              <a:extLst>
+                <a:ext uri="{FF2B5EF4-FFF2-40B4-BE49-F238E27FC236}">
+                  <a16:creationId xmlns:a16="http://schemas.microsoft.com/office/drawing/2014/main" id="{F27FB178-D30F-E74D-A7DE-C0198DC6C576}"/>
+                </a:ext>
+              </a:extLst>
+            </p:cNvPr>
+            <p:cNvSpPr txBox="1">
+              <a:spLocks/>
+            </p:cNvSpPr>
+            <p:nvPr/>
+          </p:nvSpPr>
+          <p:spPr>
+            <a:xfrm>
+              <a:off x="10694913" y="4760112"/>
+              <a:ext cx="1832920" cy="318676"/>
+            </a:xfrm>
+            <a:prstGeom prst="rect">
+              <a:avLst/>
+            </a:prstGeom>
+          </p:spPr>
+          <p:txBody>
+            <a:bodyPr vert="horz" lIns="91440" tIns="45720" rIns="91440" bIns="45720" rtlCol="0" anchor="ctr">
+              <a:noAutofit/>
+            </a:bodyPr>
+            <a:lstStyle>
+              <a:lvl1pPr algn="l" defTabSz="914400" rtl="0" eaLnBrk="1" latinLnBrk="0" hangingPunct="1">
+                <a:lnSpc>
+                  <a:spcPct val="90000"/>
+                </a:lnSpc>
+                <a:spcBef>
+                  <a:spcPct val="0"/>
+                </a:spcBef>
+                <a:buNone/>
+                <a:defRPr sz="4400" kern="1200">
+                  <a:solidFill>
+                    <a:schemeClr val="tx1"/>
+                  </a:solidFill>
+                  <a:latin typeface="+mj-lt"/>
+                  <a:ea typeface="+mj-ea"/>
+                  <a:cs typeface="+mj-cs"/>
+                </a:defRPr>
+              </a:lvl1pPr>
+            </a:lstStyle>
+            <a:p>
+              <a:pPr>
+                <a:spcBef>
+                  <a:spcPts val="2400"/>
+                </a:spcBef>
+                <a:spcAft>
+                  <a:spcPts val="2400"/>
+                </a:spcAft>
+              </a:pPr>
+              <a:r>
+                <a:rPr lang="en-GB" sz="1600" dirty="0" err="1">
+                  <a:solidFill>
+                    <a:srgbClr val="FFFFF0"/>
+                  </a:solidFill>
+                  <a:latin typeface="Avenir Book" panose="02000503020000020003" pitchFamily="2" charset="0"/>
+                </a:rPr>
+                <a:t>osr</a:t>
+              </a:r>
+              <a:r>
+                <a:rPr lang="en-GB" sz="1600" dirty="0">
+                  <a:solidFill>
+                    <a:srgbClr val="FFFFF0"/>
+                  </a:solidFill>
+                  <a:latin typeface="Avenir Book" panose="02000503020000020003" pitchFamily="2" charset="0"/>
+                </a:rPr>
+                <a:t>-future</a:t>
+              </a:r>
+              <a:endParaRPr lang="en-US" sz="1600" dirty="0">
+                <a:solidFill>
+                  <a:srgbClr val="FFFFF0"/>
+                </a:solidFill>
+                <a:latin typeface="Avenir Book" panose="02000503020000020003" pitchFamily="2" charset="0"/>
+              </a:endParaRPr>
+            </a:p>
+          </p:txBody>
+        </p:sp>
+        <p:pic>
+          <p:nvPicPr>
+            <p:cNvPr id="57" name="Picture 56">
+              <a:extLst>
+                <a:ext uri="{FF2B5EF4-FFF2-40B4-BE49-F238E27FC236}">
+                  <a16:creationId xmlns:a16="http://schemas.microsoft.com/office/drawing/2014/main" id="{DF93490A-14FD-A047-9581-7FC9B75F250C}"/>
+                </a:ext>
+              </a:extLst>
+            </p:cNvPr>
+            <p:cNvPicPr>
+              <a:picLocks noChangeAspect="1"/>
+            </p:cNvPicPr>
+            <p:nvPr/>
+          </p:nvPicPr>
+          <p:blipFill>
+            <a:blip r:embed="rId11"/>
+            <a:stretch>
+              <a:fillRect/>
+            </a:stretch>
+          </p:blipFill>
+          <p:spPr>
+            <a:xfrm>
+              <a:off x="10267830" y="4719765"/>
+              <a:ext cx="397612" cy="399371"/>
+            </a:xfrm>
+            <a:prstGeom prst="rect">
+              <a:avLst/>
+            </a:prstGeom>
+          </p:spPr>
+        </p:pic>
+      </p:grpSp>
+      <p:grpSp>
+        <p:nvGrpSpPr>
+          <p:cNvPr id="58" name="Group 57">
+            <a:extLst>
+              <a:ext uri="{FF2B5EF4-FFF2-40B4-BE49-F238E27FC236}">
+                <a16:creationId xmlns:a16="http://schemas.microsoft.com/office/drawing/2014/main" id="{85B1A910-4943-2E40-B8BF-106D9C6F8B9C}"/>
+              </a:ext>
+            </a:extLst>
+          </p:cNvPr>
+          <p:cNvGrpSpPr/>
+          <p:nvPr/>
+        </p:nvGrpSpPr>
+        <p:grpSpPr>
+          <a:xfrm>
+            <a:off x="120508" y="4726041"/>
+            <a:ext cx="2864747" cy="429351"/>
+            <a:chOff x="46077" y="4704775"/>
+            <a:chExt cx="2864747" cy="429351"/>
+          </a:xfrm>
+        </p:grpSpPr>
+        <p:pic>
+          <p:nvPicPr>
+            <p:cNvPr id="59" name="Picture 58">
+              <a:extLst>
+                <a:ext uri="{FF2B5EF4-FFF2-40B4-BE49-F238E27FC236}">
+                  <a16:creationId xmlns:a16="http://schemas.microsoft.com/office/drawing/2014/main" id="{C456C7D2-B448-B64C-8D02-09A6C8A2D295}"/>
+                </a:ext>
+              </a:extLst>
+            </p:cNvPr>
+            <p:cNvPicPr>
+              <a:picLocks noChangeAspect="1"/>
+            </p:cNvPicPr>
+            <p:nvPr/>
+          </p:nvPicPr>
+          <p:blipFill>
+            <a:blip r:embed="rId12"/>
+            <a:stretch>
+              <a:fillRect/>
+            </a:stretch>
+          </p:blipFill>
+          <p:spPr>
+            <a:xfrm>
+              <a:off x="46077" y="4730571"/>
+              <a:ext cx="377759" cy="377759"/>
+            </a:xfrm>
+            <a:prstGeom prst="rect">
+              <a:avLst/>
+            </a:prstGeom>
+          </p:spPr>
+        </p:pic>
+        <p:sp>
+          <p:nvSpPr>
+            <p:cNvPr id="60" name="Title 4">
+              <a:extLst>
+                <a:ext uri="{FF2B5EF4-FFF2-40B4-BE49-F238E27FC236}">
+                  <a16:creationId xmlns:a16="http://schemas.microsoft.com/office/drawing/2014/main" id="{89EDA0E7-2486-584C-A8CD-8396DECD6B49}"/>
+                </a:ext>
+              </a:extLst>
+            </p:cNvPr>
+            <p:cNvSpPr txBox="1">
+              <a:spLocks/>
+            </p:cNvSpPr>
+            <p:nvPr/>
+          </p:nvSpPr>
+          <p:spPr>
+            <a:xfrm>
+              <a:off x="443201" y="4704775"/>
+              <a:ext cx="2467623" cy="429351"/>
+            </a:xfrm>
+            <a:prstGeom prst="rect">
+              <a:avLst/>
+            </a:prstGeom>
+          </p:spPr>
+          <p:txBody>
+            <a:bodyPr vert="horz" lIns="91440" tIns="45720" rIns="91440" bIns="45720" rtlCol="0" anchor="ctr">
+              <a:noAutofit/>
+            </a:bodyPr>
+            <a:lstStyle>
+              <a:lvl1pPr algn="l" defTabSz="914400" rtl="0" eaLnBrk="1" latinLnBrk="0" hangingPunct="1">
+                <a:lnSpc>
+                  <a:spcPct val="90000"/>
+                </a:lnSpc>
+                <a:spcBef>
+                  <a:spcPct val="0"/>
+                </a:spcBef>
+                <a:buNone/>
+                <a:defRPr sz="4400" kern="1200">
+                  <a:solidFill>
+                    <a:schemeClr val="tx1"/>
+                  </a:solidFill>
+                  <a:latin typeface="+mj-lt"/>
+                  <a:ea typeface="+mj-ea"/>
+                  <a:cs typeface="+mj-cs"/>
+                </a:defRPr>
+              </a:lvl1pPr>
+            </a:lstStyle>
+            <a:p>
+              <a:pPr>
+                <a:spcBef>
+                  <a:spcPts val="2400"/>
+                </a:spcBef>
+                <a:spcAft>
+                  <a:spcPts val="2400"/>
+                </a:spcAft>
+              </a:pPr>
+              <a:r>
+                <a:rPr lang="en-GB" sz="1600" dirty="0" err="1">
+                  <a:solidFill>
+                    <a:srgbClr val="FFFFF0"/>
+                  </a:solidFill>
+                  <a:latin typeface="Avenir Book" panose="02000503020000020003" pitchFamily="2" charset="0"/>
+                </a:rPr>
+                <a:t>ohbm.github.io</a:t>
+              </a:r>
+              <a:r>
+                <a:rPr lang="en-GB" sz="1600" dirty="0">
+                  <a:solidFill>
+                    <a:srgbClr val="FFFFF0"/>
+                  </a:solidFill>
+                  <a:latin typeface="Avenir Book" panose="02000503020000020003" pitchFamily="2" charset="0"/>
+                </a:rPr>
+                <a:t>/osr2020</a:t>
+              </a:r>
+              <a:endParaRPr lang="en-US" sz="1600" dirty="0">
+                <a:solidFill>
+                  <a:srgbClr val="FFFFF0"/>
+                </a:solidFill>
+                <a:latin typeface="Avenir Book" panose="02000503020000020003" pitchFamily="2" charset="0"/>
+              </a:endParaRPr>
+            </a:p>
+          </p:txBody>
+        </p:sp>
+      </p:grpSp>
+    </p:spTree>
+    <p:extLst>
+      <p:ext uri="{BB962C8B-B14F-4D97-AF65-F5344CB8AC3E}">
+        <p14:creationId xmlns:p14="http://schemas.microsoft.com/office/powerpoint/2010/main" val="2022647738"/>
+      </p:ext>
+    </p:extLst>
+  </p:cSld>
+  <p:clrMapOvr>
+    <a:masterClrMapping/>
+  </p:clrMapOvr>
+</p:sld>
+</file>
+
+<file path=ppt/slides/slide51.xml><?xml version="1.0" encoding="utf-8"?>
 <p:sld xmlns:a="http://schemas.openxmlformats.org/drawingml/2006/main" xmlns:r="http://schemas.openxmlformats.org/officeDocument/2006/relationships" xmlns:p="http://schemas.openxmlformats.org/presentationml/2006/main">
   <p:cSld>
     <p:spTree>
@@ -49293,7 +50477,7 @@
 </p:sld>
 </file>
 
-<file path=ppt/slides/slide51.xml><?xml version="1.0" encoding="utf-8"?>
+<file path=ppt/slides/slide52.xml><?xml version="1.0" encoding="utf-8"?>
 <p:sld xmlns:a="http://schemas.openxmlformats.org/drawingml/2006/main" xmlns:r="http://schemas.openxmlformats.org/officeDocument/2006/relationships" xmlns:p="http://schemas.openxmlformats.org/presentationml/2006/main">
   <p:cSld>
     <p:spTree>
@@ -50263,7 +51447,7 @@
 </p:sld>
 </file>
 
-<file path=ppt/slides/slide52.xml><?xml version="1.0" encoding="utf-8"?>
+<file path=ppt/slides/slide53.xml><?xml version="1.0" encoding="utf-8"?>
 <p:sld xmlns:a="http://schemas.openxmlformats.org/drawingml/2006/main" xmlns:r="http://schemas.openxmlformats.org/officeDocument/2006/relationships" xmlns:p="http://schemas.openxmlformats.org/presentationml/2006/main">
   <p:cSld>
     <p:spTree>
@@ -51314,7 +52498,7 @@
 </p:sld>
 </file>
 
-<file path=ppt/slides/slide53.xml><?xml version="1.0" encoding="utf-8"?>
+<file path=ppt/slides/slide54.xml><?xml version="1.0" encoding="utf-8"?>
 <p:sld xmlns:a="http://schemas.openxmlformats.org/drawingml/2006/main" xmlns:r="http://schemas.openxmlformats.org/officeDocument/2006/relationships" xmlns:p="http://schemas.openxmlformats.org/presentationml/2006/main">
   <p:cSld>
     <p:spTree>
@@ -51406,7 +52590,7 @@
         </p:nvSpPr>
         <p:spPr>
           <a:xfrm>
-            <a:off x="1119196" y="2322101"/>
+            <a:off x="759600" y="2322101"/>
             <a:ext cx="7245997" cy="3518522"/>
           </a:xfrm>
         </p:spPr>
@@ -51678,7 +52862,7 @@
         </p:nvSpPr>
         <p:spPr>
           <a:xfrm>
-            <a:off x="8365194" y="2322101"/>
+            <a:off x="8006400" y="2322101"/>
             <a:ext cx="3054172" cy="3518522"/>
           </a:xfrm>
           <a:prstGeom prst="rect">
@@ -52646,7 +53830,7 @@
 </p:sld>
 </file>
 
-<file path=ppt/slides/slide54.xml><?xml version="1.0" encoding="utf-8"?>
+<file path=ppt/slides/slide55.xml><?xml version="1.0" encoding="utf-8"?>
 <p:sld xmlns:a="http://schemas.openxmlformats.org/drawingml/2006/main" xmlns:r="http://schemas.openxmlformats.org/officeDocument/2006/relationships" xmlns:p="http://schemas.openxmlformats.org/presentationml/2006/main">
   <p:cSld>
     <p:spTree>
@@ -52721,6 +53905,510 @@
     <p:extLst>
       <p:ext uri="{BB962C8B-B14F-4D97-AF65-F5344CB8AC3E}">
         <p14:creationId xmlns:p14="http://schemas.microsoft.com/office/powerpoint/2010/main" val="2689255890"/>
+      </p:ext>
+    </p:extLst>
+  </p:cSld>
+  <p:clrMapOvr>
+    <a:masterClrMapping/>
+  </p:clrMapOvr>
+</p:sld>
+</file>
+
+<file path=ppt/slides/slide56.xml><?xml version="1.0" encoding="utf-8"?>
+<p:sld xmlns:a="http://schemas.openxmlformats.org/drawingml/2006/main" xmlns:r="http://schemas.openxmlformats.org/officeDocument/2006/relationships" xmlns:p="http://schemas.openxmlformats.org/presentationml/2006/main">
+  <p:cSld>
+    <p:spTree>
+      <p:nvGrpSpPr>
+        <p:cNvPr id="1" name=""/>
+        <p:cNvGrpSpPr/>
+        <p:nvPr/>
+      </p:nvGrpSpPr>
+      <p:grpSpPr>
+        <a:xfrm>
+          <a:off x="0" y="0"/>
+          <a:ext cx="0" cy="0"/>
+          <a:chOff x="0" y="0"/>
+          <a:chExt cx="0" cy="0"/>
+        </a:xfrm>
+      </p:grpSpPr>
+      <p:sp>
+        <p:nvSpPr>
+          <p:cNvPr id="4" name="Rectangle 3">
+            <a:extLst>
+              <a:ext uri="{FF2B5EF4-FFF2-40B4-BE49-F238E27FC236}">
+                <a16:creationId xmlns:a16="http://schemas.microsoft.com/office/drawing/2014/main" id="{216ADEC4-B033-E240-8B7C-F924D33533A1}"/>
+              </a:ext>
+            </a:extLst>
+          </p:cNvPr>
+          <p:cNvSpPr/>
+          <p:nvPr/>
+        </p:nvSpPr>
+        <p:spPr>
+          <a:xfrm>
+            <a:off x="-10634" y="-10634"/>
+            <a:ext cx="12202633" cy="6868633"/>
+          </a:xfrm>
+          <a:prstGeom prst="rect">
+            <a:avLst/>
+          </a:prstGeom>
+          <a:solidFill>
+            <a:schemeClr val="tx1"/>
+          </a:solidFill>
+          <a:ln>
+            <a:solidFill>
+              <a:schemeClr val="tx1"/>
+            </a:solidFill>
+          </a:ln>
+        </p:spPr>
+        <p:style>
+          <a:lnRef idx="2">
+            <a:schemeClr val="accent1">
+              <a:shade val="50000"/>
+            </a:schemeClr>
+          </a:lnRef>
+          <a:fillRef idx="1">
+            <a:schemeClr val="accent1"/>
+          </a:fillRef>
+          <a:effectRef idx="0">
+            <a:schemeClr val="accent1"/>
+          </a:effectRef>
+          <a:fontRef idx="minor">
+            <a:schemeClr val="lt1"/>
+          </a:fontRef>
+        </p:style>
+        <p:txBody>
+          <a:bodyPr rtlCol="0" anchor="ctr"/>
+          <a:lstStyle/>
+          <a:p>
+            <a:pPr algn="ctr"/>
+            <a:endParaRPr lang="en-US" dirty="0"/>
+          </a:p>
+        </p:txBody>
+      </p:sp>
+      <p:pic>
+        <p:nvPicPr>
+          <p:cNvPr id="2" name="Picture 1">
+            <a:extLst>
+              <a:ext uri="{FF2B5EF4-FFF2-40B4-BE49-F238E27FC236}">
+                <a16:creationId xmlns:a16="http://schemas.microsoft.com/office/drawing/2014/main" id="{CF5BB8D7-7521-F24B-89B5-28487A7E1C9E}"/>
+              </a:ext>
+            </a:extLst>
+          </p:cNvPr>
+          <p:cNvPicPr>
+            <a:picLocks noChangeAspect="1"/>
+          </p:cNvPicPr>
+          <p:nvPr/>
+        </p:nvPicPr>
+        <p:blipFill>
+          <a:blip r:embed="rId2"/>
+          <a:stretch>
+            <a:fillRect/>
+          </a:stretch>
+        </p:blipFill>
+        <p:spPr>
+          <a:xfrm>
+            <a:off x="0" y="0"/>
+            <a:ext cx="12192000" cy="6858000"/>
+          </a:xfrm>
+          <a:prstGeom prst="rect">
+            <a:avLst/>
+          </a:prstGeom>
+        </p:spPr>
+      </p:pic>
+      <p:pic>
+        <p:nvPicPr>
+          <p:cNvPr id="5" name="Picture 4">
+            <a:extLst>
+              <a:ext uri="{FF2B5EF4-FFF2-40B4-BE49-F238E27FC236}">
+                <a16:creationId xmlns:a16="http://schemas.microsoft.com/office/drawing/2014/main" id="{EC9A96BA-AF29-EE43-9604-04DBCB9FCC20}"/>
+              </a:ext>
+            </a:extLst>
+          </p:cNvPr>
+          <p:cNvPicPr>
+            <a:picLocks noChangeAspect="1"/>
+          </p:cNvPicPr>
+          <p:nvPr/>
+        </p:nvPicPr>
+        <p:blipFill>
+          <a:blip r:embed="rId3"/>
+          <a:stretch>
+            <a:fillRect/>
+          </a:stretch>
+        </p:blipFill>
+        <p:spPr>
+          <a:xfrm>
+            <a:off x="0" y="0"/>
+            <a:ext cx="12202632" cy="6863981"/>
+          </a:xfrm>
+          <a:prstGeom prst="rect">
+            <a:avLst/>
+          </a:prstGeom>
+        </p:spPr>
+      </p:pic>
+      <p:sp>
+        <p:nvSpPr>
+          <p:cNvPr id="6" name="Rectangle 5">
+            <a:extLst>
+              <a:ext uri="{FF2B5EF4-FFF2-40B4-BE49-F238E27FC236}">
+                <a16:creationId xmlns:a16="http://schemas.microsoft.com/office/drawing/2014/main" id="{BD51F745-D989-C643-B5D0-96A368706737}"/>
+              </a:ext>
+            </a:extLst>
+          </p:cNvPr>
+          <p:cNvSpPr/>
+          <p:nvPr/>
+        </p:nvSpPr>
+        <p:spPr>
+          <a:xfrm>
+            <a:off x="0" y="0"/>
+            <a:ext cx="620486" cy="6858000"/>
+          </a:xfrm>
+          <a:prstGeom prst="rect">
+            <a:avLst/>
+          </a:prstGeom>
+          <a:solidFill>
+            <a:schemeClr val="tx1"/>
+          </a:solidFill>
+          <a:ln>
+            <a:solidFill>
+              <a:schemeClr val="tx1"/>
+            </a:solidFill>
+          </a:ln>
+        </p:spPr>
+        <p:style>
+          <a:lnRef idx="2">
+            <a:schemeClr val="accent1">
+              <a:shade val="50000"/>
+            </a:schemeClr>
+          </a:lnRef>
+          <a:fillRef idx="1">
+            <a:schemeClr val="accent1"/>
+          </a:fillRef>
+          <a:effectRef idx="0">
+            <a:schemeClr val="accent1"/>
+          </a:effectRef>
+          <a:fontRef idx="minor">
+            <a:schemeClr val="lt1"/>
+          </a:fontRef>
+        </p:style>
+        <p:txBody>
+          <a:bodyPr rtlCol="0" anchor="ctr"/>
+          <a:lstStyle/>
+          <a:p>
+            <a:pPr algn="ctr"/>
+            <a:endParaRPr lang="en-US"/>
+          </a:p>
+        </p:txBody>
+      </p:sp>
+      <p:sp>
+        <p:nvSpPr>
+          <p:cNvPr id="7" name="Rectangle 6">
+            <a:extLst>
+              <a:ext uri="{FF2B5EF4-FFF2-40B4-BE49-F238E27FC236}">
+                <a16:creationId xmlns:a16="http://schemas.microsoft.com/office/drawing/2014/main" id="{78B93B39-0B5D-BD49-91BC-31ADD163F690}"/>
+              </a:ext>
+            </a:extLst>
+          </p:cNvPr>
+          <p:cNvSpPr/>
+          <p:nvPr/>
+        </p:nvSpPr>
+        <p:spPr>
+          <a:xfrm>
+            <a:off x="11582146" y="0"/>
+            <a:ext cx="620486" cy="6858000"/>
+          </a:xfrm>
+          <a:prstGeom prst="rect">
+            <a:avLst/>
+          </a:prstGeom>
+          <a:solidFill>
+            <a:schemeClr val="tx1"/>
+          </a:solidFill>
+          <a:ln>
+            <a:solidFill>
+              <a:schemeClr val="tx1"/>
+            </a:solidFill>
+          </a:ln>
+        </p:spPr>
+        <p:style>
+          <a:lnRef idx="2">
+            <a:schemeClr val="accent1">
+              <a:shade val="50000"/>
+            </a:schemeClr>
+          </a:lnRef>
+          <a:fillRef idx="1">
+            <a:schemeClr val="accent1"/>
+          </a:fillRef>
+          <a:effectRef idx="0">
+            <a:schemeClr val="accent1"/>
+          </a:effectRef>
+          <a:fontRef idx="minor">
+            <a:schemeClr val="lt1"/>
+          </a:fontRef>
+        </p:style>
+        <p:txBody>
+          <a:bodyPr rtlCol="0" anchor="ctr"/>
+          <a:lstStyle/>
+          <a:p>
+            <a:pPr algn="ctr"/>
+            <a:endParaRPr lang="en-US"/>
+          </a:p>
+        </p:txBody>
+      </p:sp>
+    </p:spTree>
+    <p:extLst>
+      <p:ext uri="{BB962C8B-B14F-4D97-AF65-F5344CB8AC3E}">
+        <p14:creationId xmlns:p14="http://schemas.microsoft.com/office/powerpoint/2010/main" val="1661594007"/>
+      </p:ext>
+    </p:extLst>
+  </p:cSld>
+  <p:clrMapOvr>
+    <a:masterClrMapping/>
+  </p:clrMapOvr>
+</p:sld>
+</file>
+
+<file path=ppt/slides/slide57.xml><?xml version="1.0" encoding="utf-8"?>
+<p:sld xmlns:a="http://schemas.openxmlformats.org/drawingml/2006/main" xmlns:r="http://schemas.openxmlformats.org/officeDocument/2006/relationships" xmlns:p="http://schemas.openxmlformats.org/presentationml/2006/main">
+  <p:cSld>
+    <p:spTree>
+      <p:nvGrpSpPr>
+        <p:cNvPr id="1" name=""/>
+        <p:cNvGrpSpPr/>
+        <p:nvPr/>
+      </p:nvGrpSpPr>
+      <p:grpSpPr>
+        <a:xfrm>
+          <a:off x="0" y="0"/>
+          <a:ext cx="0" cy="0"/>
+          <a:chOff x="0" y="0"/>
+          <a:chExt cx="0" cy="0"/>
+        </a:xfrm>
+      </p:grpSpPr>
+      <p:sp>
+        <p:nvSpPr>
+          <p:cNvPr id="4" name="Rectangle 3">
+            <a:extLst>
+              <a:ext uri="{FF2B5EF4-FFF2-40B4-BE49-F238E27FC236}">
+                <a16:creationId xmlns:a16="http://schemas.microsoft.com/office/drawing/2014/main" id="{216ADEC4-B033-E240-8B7C-F924D33533A1}"/>
+              </a:ext>
+            </a:extLst>
+          </p:cNvPr>
+          <p:cNvSpPr/>
+          <p:nvPr/>
+        </p:nvSpPr>
+        <p:spPr>
+          <a:xfrm>
+            <a:off x="-10634" y="-10634"/>
+            <a:ext cx="12202633" cy="6868633"/>
+          </a:xfrm>
+          <a:prstGeom prst="rect">
+            <a:avLst/>
+          </a:prstGeom>
+          <a:solidFill>
+            <a:schemeClr val="tx1"/>
+          </a:solidFill>
+          <a:ln>
+            <a:solidFill>
+              <a:schemeClr val="tx1"/>
+            </a:solidFill>
+          </a:ln>
+        </p:spPr>
+        <p:style>
+          <a:lnRef idx="2">
+            <a:schemeClr val="accent1">
+              <a:shade val="50000"/>
+            </a:schemeClr>
+          </a:lnRef>
+          <a:fillRef idx="1">
+            <a:schemeClr val="accent1"/>
+          </a:fillRef>
+          <a:effectRef idx="0">
+            <a:schemeClr val="accent1"/>
+          </a:effectRef>
+          <a:fontRef idx="minor">
+            <a:schemeClr val="lt1"/>
+          </a:fontRef>
+        </p:style>
+        <p:txBody>
+          <a:bodyPr rtlCol="0" anchor="ctr"/>
+          <a:lstStyle/>
+          <a:p>
+            <a:pPr algn="ctr"/>
+            <a:endParaRPr lang="en-US" dirty="0"/>
+          </a:p>
+        </p:txBody>
+      </p:sp>
+      <p:pic>
+        <p:nvPicPr>
+          <p:cNvPr id="2" name="Picture 1">
+            <a:extLst>
+              <a:ext uri="{FF2B5EF4-FFF2-40B4-BE49-F238E27FC236}">
+                <a16:creationId xmlns:a16="http://schemas.microsoft.com/office/drawing/2014/main" id="{CF5BB8D7-7521-F24B-89B5-28487A7E1C9E}"/>
+              </a:ext>
+            </a:extLst>
+          </p:cNvPr>
+          <p:cNvPicPr>
+            <a:picLocks noChangeAspect="1"/>
+          </p:cNvPicPr>
+          <p:nvPr/>
+        </p:nvPicPr>
+        <p:blipFill>
+          <a:blip r:embed="rId2"/>
+          <a:stretch>
+            <a:fillRect/>
+          </a:stretch>
+        </p:blipFill>
+        <p:spPr>
+          <a:xfrm>
+            <a:off x="0" y="0"/>
+            <a:ext cx="12192000" cy="6858000"/>
+          </a:xfrm>
+          <a:prstGeom prst="rect">
+            <a:avLst/>
+          </a:prstGeom>
+        </p:spPr>
+      </p:pic>
+      <p:pic>
+        <p:nvPicPr>
+          <p:cNvPr id="8" name="Picture 7">
+            <a:extLst>
+              <a:ext uri="{FF2B5EF4-FFF2-40B4-BE49-F238E27FC236}">
+                <a16:creationId xmlns:a16="http://schemas.microsoft.com/office/drawing/2014/main" id="{8CA4EFF3-FFC1-6C44-AE5E-9C897587DCCE}"/>
+              </a:ext>
+            </a:extLst>
+          </p:cNvPr>
+          <p:cNvPicPr>
+            <a:picLocks noChangeAspect="1"/>
+          </p:cNvPicPr>
+          <p:nvPr/>
+        </p:nvPicPr>
+        <p:blipFill>
+          <a:blip r:embed="rId3"/>
+          <a:stretch>
+            <a:fillRect/>
+          </a:stretch>
+        </p:blipFill>
+        <p:spPr>
+          <a:xfrm>
+            <a:off x="0" y="0"/>
+            <a:ext cx="12192000" cy="6858000"/>
+          </a:xfrm>
+          <a:prstGeom prst="rect">
+            <a:avLst/>
+          </a:prstGeom>
+        </p:spPr>
+      </p:pic>
+      <p:sp>
+        <p:nvSpPr>
+          <p:cNvPr id="6" name="Rectangle 5">
+            <a:extLst>
+              <a:ext uri="{FF2B5EF4-FFF2-40B4-BE49-F238E27FC236}">
+                <a16:creationId xmlns:a16="http://schemas.microsoft.com/office/drawing/2014/main" id="{BD51F745-D989-C643-B5D0-96A368706737}"/>
+              </a:ext>
+            </a:extLst>
+          </p:cNvPr>
+          <p:cNvSpPr/>
+          <p:nvPr/>
+        </p:nvSpPr>
+        <p:spPr>
+          <a:xfrm>
+            <a:off x="0" y="0"/>
+            <a:ext cx="620486" cy="6858000"/>
+          </a:xfrm>
+          <a:prstGeom prst="rect">
+            <a:avLst/>
+          </a:prstGeom>
+          <a:solidFill>
+            <a:schemeClr val="tx1"/>
+          </a:solidFill>
+          <a:ln>
+            <a:solidFill>
+              <a:schemeClr val="tx1"/>
+            </a:solidFill>
+          </a:ln>
+        </p:spPr>
+        <p:style>
+          <a:lnRef idx="2">
+            <a:schemeClr val="accent1">
+              <a:shade val="50000"/>
+            </a:schemeClr>
+          </a:lnRef>
+          <a:fillRef idx="1">
+            <a:schemeClr val="accent1"/>
+          </a:fillRef>
+          <a:effectRef idx="0">
+            <a:schemeClr val="accent1"/>
+          </a:effectRef>
+          <a:fontRef idx="minor">
+            <a:schemeClr val="lt1"/>
+          </a:fontRef>
+        </p:style>
+        <p:txBody>
+          <a:bodyPr rtlCol="0" anchor="ctr"/>
+          <a:lstStyle/>
+          <a:p>
+            <a:pPr algn="ctr"/>
+            <a:endParaRPr lang="en-US"/>
+          </a:p>
+        </p:txBody>
+      </p:sp>
+      <p:sp>
+        <p:nvSpPr>
+          <p:cNvPr id="7" name="Rectangle 6">
+            <a:extLst>
+              <a:ext uri="{FF2B5EF4-FFF2-40B4-BE49-F238E27FC236}">
+                <a16:creationId xmlns:a16="http://schemas.microsoft.com/office/drawing/2014/main" id="{78B93B39-0B5D-BD49-91BC-31ADD163F690}"/>
+              </a:ext>
+            </a:extLst>
+          </p:cNvPr>
+          <p:cNvSpPr/>
+          <p:nvPr/>
+        </p:nvSpPr>
+        <p:spPr>
+          <a:xfrm>
+            <a:off x="11560375" y="0"/>
+            <a:ext cx="620486" cy="6858000"/>
+          </a:xfrm>
+          <a:prstGeom prst="rect">
+            <a:avLst/>
+          </a:prstGeom>
+          <a:solidFill>
+            <a:schemeClr val="tx1"/>
+          </a:solidFill>
+          <a:ln>
+            <a:solidFill>
+              <a:schemeClr val="tx1"/>
+            </a:solidFill>
+          </a:ln>
+        </p:spPr>
+        <p:style>
+          <a:lnRef idx="2">
+            <a:schemeClr val="accent1">
+              <a:shade val="50000"/>
+            </a:schemeClr>
+          </a:lnRef>
+          <a:fillRef idx="1">
+            <a:schemeClr val="accent1"/>
+          </a:fillRef>
+          <a:effectRef idx="0">
+            <a:schemeClr val="accent1"/>
+          </a:effectRef>
+          <a:fontRef idx="minor">
+            <a:schemeClr val="lt1"/>
+          </a:fontRef>
+        </p:style>
+        <p:txBody>
+          <a:bodyPr rtlCol="0" anchor="ctr"/>
+          <a:lstStyle/>
+          <a:p>
+            <a:pPr algn="ctr"/>
+            <a:endParaRPr lang="en-US"/>
+          </a:p>
+        </p:txBody>
+      </p:sp>
+    </p:spTree>
+    <p:extLst>
+      <p:ext uri="{BB962C8B-B14F-4D97-AF65-F5344CB8AC3E}">
+        <p14:creationId xmlns:p14="http://schemas.microsoft.com/office/powerpoint/2010/main" val="720151812"/>
       </p:ext>
     </p:extLst>
   </p:cSld>

</xml_diff>